<commit_message>
delete power point page 1
</commit_message>
<xml_diff>
--- a/Powerpoint file.pptx
+++ b/Powerpoint file.pptx
@@ -5,18 +5,17 @@
     <p:sldMasterId id="2147483648" r:id="rId1"/>
   </p:sldMasterIdLst>
   <p:notesMasterIdLst>
-    <p:notesMasterId r:id="rId11"/>
+    <p:notesMasterId r:id="rId10"/>
   </p:notesMasterIdLst>
   <p:sldIdLst>
-    <p:sldId id="256" r:id="rId2"/>
-    <p:sldId id="257" r:id="rId3"/>
-    <p:sldId id="258" r:id="rId4"/>
-    <p:sldId id="259" r:id="rId5"/>
-    <p:sldId id="307" r:id="rId6"/>
-    <p:sldId id="260" r:id="rId7"/>
-    <p:sldId id="261" r:id="rId8"/>
-    <p:sldId id="262" r:id="rId9"/>
-    <p:sldId id="263" r:id="rId10"/>
+    <p:sldId id="257" r:id="rId2"/>
+    <p:sldId id="258" r:id="rId3"/>
+    <p:sldId id="259" r:id="rId4"/>
+    <p:sldId id="307" r:id="rId5"/>
+    <p:sldId id="260" r:id="rId6"/>
+    <p:sldId id="261" r:id="rId7"/>
+    <p:sldId id="262" r:id="rId8"/>
+    <p:sldId id="263" r:id="rId9"/>
   </p:sldIdLst>
   <p:sldSz cx="13004800" cy="9753600"/>
   <p:notesSz cx="6858000" cy="9144000"/>
@@ -3828,7 +3827,7 @@
           </a:ln>
           <a:extLst>
             <a:ext uri="{C572A759-6A51-4108-AA02-DFA0A04FC94B}">
-              <ma14:wrappingTextBoxFlag xmlns="" xmlns:m="http://schemas.openxmlformats.org/officeDocument/2006/math" xmlns:a14="http://schemas.microsoft.com/office/drawing/2010/main" xmlns:ma14="http://schemas.microsoft.com/office/mac/drawingml/2011/main" val="1"/>
+              <ma14:wrappingTextBoxFlag xmlns:ma14="http://schemas.microsoft.com/office/mac/drawingml/2011/main" xmlns:a14="http://schemas.microsoft.com/office/drawing/2010/main" xmlns:m="http://schemas.openxmlformats.org/officeDocument/2006/math" xmlns="" val="1"/>
             </a:ext>
           </a:extLst>
         </p:spPr>
@@ -3867,7 +3866,7 @@
           </a:ln>
           <a:extLst>
             <a:ext uri="{C572A759-6A51-4108-AA02-DFA0A04FC94B}">
-              <ma14:wrappingTextBoxFlag xmlns="" xmlns:m="http://schemas.openxmlformats.org/officeDocument/2006/math" xmlns:a14="http://schemas.microsoft.com/office/drawing/2010/main" xmlns:ma14="http://schemas.microsoft.com/office/mac/drawingml/2011/main" val="1"/>
+              <ma14:wrappingTextBoxFlag xmlns:ma14="http://schemas.microsoft.com/office/mac/drawingml/2011/main" xmlns:a14="http://schemas.microsoft.com/office/drawing/2010/main" xmlns:m="http://schemas.openxmlformats.org/officeDocument/2006/math" xmlns="" val="1"/>
             </a:ext>
           </a:extLst>
         </p:spPr>
@@ -4828,551 +4827,6 @@
       </p:grpSpPr>
       <p:sp>
         <p:nvSpPr>
-          <p:cNvPr id="175" name="IC Candidates"/>
-          <p:cNvSpPr txBox="1">
-            <a:spLocks noGrp="1"/>
-          </p:cNvSpPr>
-          <p:nvPr>
-            <p:ph type="body" idx="13"/>
-          </p:nvPr>
-        </p:nvSpPr>
-        <p:spPr>
-          <a:prstGeom prst="rect">
-            <a:avLst/>
-          </a:prstGeom>
-        </p:spPr>
-        <p:txBody>
-          <a:bodyPr/>
-          <a:lstStyle/>
-          <a:p>
-            <a:r>
-              <a:rPr dirty="0"/>
-              <a:t>IC Candidates</a:t>
-            </a:r>
-          </a:p>
-        </p:txBody>
-      </p:sp>
-      <p:sp>
-        <p:nvSpPr>
-          <p:cNvPr id="176" name="Title 1"/>
-          <p:cNvSpPr txBox="1">
-            <a:spLocks noGrp="1"/>
-          </p:cNvSpPr>
-          <p:nvPr>
-            <p:ph type="title"/>
-          </p:nvPr>
-        </p:nvSpPr>
-        <p:spPr>
-          <a:xfrm>
-            <a:off x="406400" y="1153416"/>
-            <a:ext cx="12192000" cy="723900"/>
-          </a:xfrm>
-          <a:prstGeom prst="rect">
-            <a:avLst/>
-          </a:prstGeom>
-        </p:spPr>
-        <p:txBody>
-          <a:bodyPr/>
-          <a:lstStyle>
-            <a:lvl1pPr defTabSz="467359">
-              <a:spcBef>
-                <a:spcPts val="2200"/>
-              </a:spcBef>
-              <a:defRPr sz="4800"/>
-            </a:lvl1pPr>
-          </a:lstStyle>
-          <a:p>
-            <a:r>
-              <a:rPr dirty="0"/>
-              <a:t>Ms. </a:t>
-            </a:r>
-            <a:r>
-              <a:rPr dirty="0" err="1"/>
-              <a:t>Jureerat</a:t>
-            </a:r>
-            <a:r>
-              <a:rPr dirty="0"/>
-              <a:t>  </a:t>
-            </a:r>
-            <a:r>
-              <a:rPr dirty="0" err="1"/>
-              <a:t>Lapanavanich</a:t>
-            </a:r>
-            <a:endParaRPr dirty="0"/>
-          </a:p>
-        </p:txBody>
-      </p:sp>
-      <p:sp>
-        <p:nvSpPr>
-          <p:cNvPr id="177" name="Content Placeholder 2"/>
-          <p:cNvSpPr txBox="1">
-            <a:spLocks noGrp="1"/>
-          </p:cNvSpPr>
-          <p:nvPr>
-            <p:ph type="body" idx="1"/>
-          </p:nvPr>
-        </p:nvSpPr>
-        <p:spPr>
-          <a:xfrm>
-            <a:off x="3936237" y="2142836"/>
-            <a:ext cx="8662163" cy="6297468"/>
-          </a:xfrm>
-          <a:prstGeom prst="rect">
-            <a:avLst/>
-          </a:prstGeom>
-        </p:spPr>
-        <p:txBody>
-          <a:bodyPr>
-            <a:normAutofit/>
-          </a:bodyPr>
-          <a:lstStyle/>
-          <a:p>
-            <a:pPr marL="0" indent="0" defTabSz="420624">
-              <a:lnSpc>
-                <a:spcPct val="81000"/>
-              </a:lnSpc>
-              <a:spcBef>
-                <a:spcPts val="2000"/>
-              </a:spcBef>
-              <a:buSzTx/>
-              <a:buNone/>
-              <a:defRPr sz="1728" u="sng">
-                <a:solidFill>
-                  <a:srgbClr val="000000"/>
-                </a:solidFill>
-              </a:defRPr>
-            </a:pPr>
-            <a:r>
-              <a:rPr sz="2000" b="1" dirty="0">
-                <a:latin typeface="+mn-lt"/>
-              </a:rPr>
-              <a:t>Education</a:t>
-            </a:r>
-          </a:p>
-          <a:p>
-            <a:pPr marL="0" indent="0" defTabSz="420624">
-              <a:lnSpc>
-                <a:spcPct val="81000"/>
-              </a:lnSpc>
-              <a:spcBef>
-                <a:spcPts val="2000"/>
-              </a:spcBef>
-              <a:buSzTx/>
-              <a:buNone/>
-              <a:defRPr sz="1728">
-                <a:solidFill>
-                  <a:srgbClr val="000000"/>
-                </a:solidFill>
-              </a:defRPr>
-            </a:pPr>
-            <a:r>
-              <a:rPr sz="2000" dirty="0">
-                <a:latin typeface="+mn-lt"/>
-              </a:rPr>
-              <a:t>• Master of General Management, Mahidol University</a:t>
-            </a:r>
-          </a:p>
-          <a:p>
-            <a:pPr marL="0" indent="0" defTabSz="420624">
-              <a:lnSpc>
-                <a:spcPct val="81000"/>
-              </a:lnSpc>
-              <a:spcBef>
-                <a:spcPts val="2000"/>
-              </a:spcBef>
-              <a:buSzTx/>
-              <a:buNone/>
-              <a:defRPr sz="1728">
-                <a:solidFill>
-                  <a:srgbClr val="000000"/>
-                </a:solidFill>
-              </a:defRPr>
-            </a:pPr>
-            <a:r>
-              <a:rPr sz="2000" dirty="0">
-                <a:latin typeface="+mn-lt"/>
-              </a:rPr>
-              <a:t>• Bachelor of </a:t>
-            </a:r>
-            <a:r>
-              <a:rPr sz="2000" dirty="0" err="1">
-                <a:latin typeface="+mn-lt"/>
-              </a:rPr>
-              <a:t>Internation</a:t>
-            </a:r>
-            <a:r>
-              <a:rPr sz="2000" dirty="0">
-                <a:latin typeface="+mn-lt"/>
-              </a:rPr>
-              <a:t> Management, Chulalongkorn University</a:t>
-            </a:r>
-          </a:p>
-          <a:p>
-            <a:pPr marL="0" indent="0" defTabSz="420624">
-              <a:lnSpc>
-                <a:spcPct val="81000"/>
-              </a:lnSpc>
-              <a:spcBef>
-                <a:spcPts val="2000"/>
-              </a:spcBef>
-              <a:buSzTx/>
-              <a:buNone/>
-              <a:defRPr sz="1728" u="sng">
-                <a:solidFill>
-                  <a:srgbClr val="000000"/>
-                </a:solidFill>
-              </a:defRPr>
-            </a:pPr>
-            <a:r>
-              <a:rPr sz="2000" b="1" dirty="0">
-                <a:latin typeface="+mn-lt"/>
-              </a:rPr>
-              <a:t>Working Experiences</a:t>
-            </a:r>
-          </a:p>
-          <a:p>
-            <a:pPr marL="0" indent="0" defTabSz="420624">
-              <a:lnSpc>
-                <a:spcPct val="81000"/>
-              </a:lnSpc>
-              <a:spcBef>
-                <a:spcPts val="2000"/>
-              </a:spcBef>
-              <a:buSzTx/>
-              <a:buNone/>
-              <a:defRPr sz="1728">
-                <a:solidFill>
-                  <a:srgbClr val="000000"/>
-                </a:solidFill>
-              </a:defRPr>
-            </a:pPr>
-            <a:r>
-              <a:rPr sz="2000" dirty="0">
-                <a:latin typeface="+mn-lt"/>
-              </a:rPr>
-              <a:t>• 2015 – Present: Executive Vice President of Accounting and Financial of </a:t>
-            </a:r>
-            <a:r>
-              <a:rPr sz="2000" dirty="0" err="1">
-                <a:latin typeface="+mn-lt"/>
-              </a:rPr>
-              <a:t>Millcon</a:t>
-            </a:r>
-            <a:r>
-              <a:rPr sz="2000" dirty="0">
-                <a:latin typeface="+mn-lt"/>
-              </a:rPr>
-              <a:t> Steel Plc. </a:t>
-            </a:r>
-          </a:p>
-          <a:p>
-            <a:pPr marL="0" indent="0" defTabSz="420624">
-              <a:lnSpc>
-                <a:spcPct val="81000"/>
-              </a:lnSpc>
-              <a:spcBef>
-                <a:spcPts val="2000"/>
-              </a:spcBef>
-              <a:buSzTx/>
-              <a:buNone/>
-              <a:defRPr sz="1728">
-                <a:solidFill>
-                  <a:srgbClr val="000000"/>
-                </a:solidFill>
-              </a:defRPr>
-            </a:pPr>
-            <a:r>
-              <a:rPr sz="2000" dirty="0">
-                <a:latin typeface="+mn-lt"/>
-              </a:rPr>
-              <a:t>• 2015 – Present: Investment Committee Member of </a:t>
-            </a:r>
-            <a:r>
-              <a:rPr sz="2000" dirty="0" err="1">
-                <a:latin typeface="+mn-lt"/>
-              </a:rPr>
-              <a:t>Millcon</a:t>
-            </a:r>
-            <a:r>
-              <a:rPr sz="2000" dirty="0">
-                <a:latin typeface="+mn-lt"/>
-              </a:rPr>
-              <a:t> Steel </a:t>
-            </a:r>
-          </a:p>
-          <a:p>
-            <a:pPr marL="0" indent="0" defTabSz="420624">
-              <a:lnSpc>
-                <a:spcPct val="81000"/>
-              </a:lnSpc>
-              <a:spcBef>
-                <a:spcPts val="2000"/>
-              </a:spcBef>
-              <a:buSzTx/>
-              <a:buNone/>
-              <a:defRPr sz="1728">
-                <a:solidFill>
-                  <a:srgbClr val="000000"/>
-                </a:solidFill>
-              </a:defRPr>
-            </a:pPr>
-            <a:r>
-              <a:rPr sz="2000" dirty="0">
-                <a:latin typeface="+mn-lt"/>
-              </a:rPr>
-              <a:t>• 2014 – 2015: Director of </a:t>
-            </a:r>
-            <a:r>
-              <a:rPr sz="2000" dirty="0" err="1">
-                <a:latin typeface="+mn-lt"/>
-              </a:rPr>
-              <a:t>Millcon</a:t>
-            </a:r>
-            <a:r>
-              <a:rPr sz="2000" dirty="0">
-                <a:latin typeface="+mn-lt"/>
-              </a:rPr>
-              <a:t> Special Steel </a:t>
-            </a:r>
-            <a:r>
-              <a:rPr sz="2000" dirty="0" err="1">
-                <a:latin typeface="+mn-lt"/>
-              </a:rPr>
-              <a:t>Co.,Ltd</a:t>
-            </a:r>
-            <a:r>
-              <a:rPr sz="2000" dirty="0">
-                <a:latin typeface="+mn-lt"/>
-              </a:rPr>
-              <a:t>. </a:t>
-            </a:r>
-          </a:p>
-          <a:p>
-            <a:pPr marL="0" indent="0" defTabSz="420624">
-              <a:lnSpc>
-                <a:spcPct val="81000"/>
-              </a:lnSpc>
-              <a:spcBef>
-                <a:spcPts val="2000"/>
-              </a:spcBef>
-              <a:buSzTx/>
-              <a:buNone/>
-              <a:defRPr sz="1728">
-                <a:solidFill>
-                  <a:srgbClr val="000000"/>
-                </a:solidFill>
-              </a:defRPr>
-            </a:pPr>
-            <a:r>
-              <a:rPr sz="2000" dirty="0">
-                <a:latin typeface="+mn-lt"/>
-              </a:rPr>
-              <a:t>• 2012 – 2015: Director of </a:t>
-            </a:r>
-            <a:r>
-              <a:rPr sz="2000" dirty="0" err="1">
-                <a:latin typeface="+mn-lt"/>
-              </a:rPr>
-              <a:t>Zentra-wartung</a:t>
-            </a:r>
-            <a:r>
-              <a:rPr sz="2000" dirty="0">
-                <a:latin typeface="+mn-lt"/>
-              </a:rPr>
-              <a:t> Engineering Co., Ltd. </a:t>
-            </a:r>
-          </a:p>
-          <a:p>
-            <a:pPr marL="0" indent="0" defTabSz="420624">
-              <a:lnSpc>
-                <a:spcPct val="81000"/>
-              </a:lnSpc>
-              <a:spcBef>
-                <a:spcPts val="2000"/>
-              </a:spcBef>
-              <a:buSzTx/>
-              <a:buNone/>
-              <a:defRPr sz="1728">
-                <a:solidFill>
-                  <a:srgbClr val="000000"/>
-                </a:solidFill>
-              </a:defRPr>
-            </a:pPr>
-            <a:r>
-              <a:rPr sz="2000" dirty="0">
-                <a:latin typeface="+mn-lt"/>
-              </a:rPr>
-              <a:t>• 2011 – 2014: Head of CEO Office of </a:t>
-            </a:r>
-            <a:r>
-              <a:rPr sz="2000" dirty="0" err="1">
-                <a:latin typeface="+mn-lt"/>
-              </a:rPr>
-              <a:t>Millcon</a:t>
-            </a:r>
-            <a:r>
-              <a:rPr sz="2000" dirty="0">
-                <a:latin typeface="+mn-lt"/>
-              </a:rPr>
-              <a:t> Steel Plc </a:t>
-            </a:r>
-          </a:p>
-          <a:p>
-            <a:pPr marL="0" indent="0" defTabSz="420624">
-              <a:lnSpc>
-                <a:spcPct val="81000"/>
-              </a:lnSpc>
-              <a:spcBef>
-                <a:spcPts val="2000"/>
-              </a:spcBef>
-              <a:buSzTx/>
-              <a:buNone/>
-              <a:defRPr sz="1728">
-                <a:solidFill>
-                  <a:srgbClr val="000000"/>
-                </a:solidFill>
-              </a:defRPr>
-            </a:pPr>
-            <a:r>
-              <a:rPr sz="2000" dirty="0">
-                <a:latin typeface="+mn-lt"/>
-              </a:rPr>
-              <a:t>• 2010 – present: Director of </a:t>
-            </a:r>
-            <a:r>
-              <a:rPr sz="2000" dirty="0" err="1">
-                <a:latin typeface="+mn-lt"/>
-              </a:rPr>
-              <a:t>Millcon</a:t>
-            </a:r>
-            <a:r>
-              <a:rPr sz="2000" dirty="0">
-                <a:latin typeface="+mn-lt"/>
-              </a:rPr>
-              <a:t> </a:t>
-            </a:r>
-            <a:r>
-              <a:rPr sz="2000" dirty="0" err="1">
-                <a:latin typeface="+mn-lt"/>
-              </a:rPr>
-              <a:t>Burapa</a:t>
-            </a:r>
-            <a:r>
-              <a:rPr sz="2000" dirty="0">
-                <a:latin typeface="+mn-lt"/>
-              </a:rPr>
-              <a:t> </a:t>
-            </a:r>
-            <a:r>
-              <a:rPr sz="2000" dirty="0" err="1">
-                <a:latin typeface="+mn-lt"/>
-              </a:rPr>
-              <a:t>Co.,Ltd</a:t>
-            </a:r>
-            <a:r>
-              <a:rPr sz="2000" dirty="0">
-                <a:latin typeface="+mn-lt"/>
-              </a:rPr>
-              <a:t>.</a:t>
-            </a:r>
-          </a:p>
-          <a:p>
-            <a:pPr marL="0" indent="0" defTabSz="420624">
-              <a:lnSpc>
-                <a:spcPct val="81000"/>
-              </a:lnSpc>
-              <a:spcBef>
-                <a:spcPts val="2000"/>
-              </a:spcBef>
-              <a:buSzTx/>
-              <a:buNone/>
-              <a:defRPr sz="1728">
-                <a:solidFill>
-                  <a:srgbClr val="000000"/>
-                </a:solidFill>
-              </a:defRPr>
-            </a:pPr>
-            <a:r>
-              <a:rPr sz="2000" dirty="0">
-                <a:latin typeface="+mn-lt"/>
-              </a:rPr>
-              <a:t>• 2009 – present: Executive Director of </a:t>
-            </a:r>
-            <a:r>
-              <a:rPr sz="2000" dirty="0" err="1">
-                <a:latin typeface="+mn-lt"/>
-              </a:rPr>
-              <a:t>Millcon</a:t>
-            </a:r>
-            <a:r>
-              <a:rPr sz="2000" dirty="0">
-                <a:latin typeface="+mn-lt"/>
-              </a:rPr>
-              <a:t> Steel Plc.</a:t>
-            </a:r>
-            <a:endParaRPr sz="1800" dirty="0">
-              <a:latin typeface="+mn-lt"/>
-            </a:endParaRPr>
-          </a:p>
-        </p:txBody>
-      </p:sp>
-      <p:pic>
-        <p:nvPicPr>
-          <p:cNvPr id="178" name="Picture 3" descr="Picture 3"/>
-          <p:cNvPicPr>
-            <a:picLocks noChangeAspect="1"/>
-          </p:cNvPicPr>
-          <p:nvPr/>
-        </p:nvPicPr>
-        <p:blipFill>
-          <a:blip r:embed="rId2">
-            <a:extLst/>
-          </a:blip>
-          <a:stretch>
-            <a:fillRect/>
-          </a:stretch>
-        </p:blipFill>
-        <p:spPr>
-          <a:xfrm>
-            <a:off x="406400" y="2142836"/>
-            <a:ext cx="3056904" cy="3346504"/>
-          </a:xfrm>
-          <a:prstGeom prst="rect">
-            <a:avLst/>
-          </a:prstGeom>
-          <a:ln w="12700">
-            <a:miter lim="400000"/>
-          </a:ln>
-        </p:spPr>
-      </p:pic>
-    </p:spTree>
-  </p:cSld>
-  <p:clrMapOvr>
-    <a:masterClrMapping/>
-  </p:clrMapOvr>
-  <p:transition spd="med"/>
-</p:sld>
-</file>
-
-<file path=ppt/slides/slide2.xml><?xml version="1.0" encoding="utf-8"?>
-<p:sld xmlns:a="http://schemas.openxmlformats.org/drawingml/2006/main" xmlns:r="http://schemas.openxmlformats.org/officeDocument/2006/relationships" xmlns:p="http://schemas.openxmlformats.org/presentationml/2006/main">
-  <p:cSld>
-    <p:spTree>
-      <p:nvGrpSpPr>
-        <p:cNvPr id="1" name=""/>
-        <p:cNvGrpSpPr/>
-        <p:nvPr/>
-      </p:nvGrpSpPr>
-      <p:grpSpPr>
-        <a:xfrm>
-          <a:off x="0" y="0"/>
-          <a:ext cx="0" cy="0"/>
-          <a:chOff x="0" y="0"/>
-          <a:chExt cx="0" cy="0"/>
-        </a:xfrm>
-      </p:grpSpPr>
-      <p:sp>
-        <p:nvSpPr>
           <p:cNvPr id="180" name="IC candidates"/>
           <p:cNvSpPr txBox="1">
             <a:spLocks noGrp="1"/>
@@ -5405,9 +4859,7 @@
           <p:nvPr/>
         </p:nvPicPr>
         <p:blipFill>
-          <a:blip r:embed="rId2">
-            <a:extLst/>
-          </a:blip>
+          <a:blip r:embed="rId2"/>
           <a:stretch>
             <a:fillRect/>
           </a:stretch>
@@ -5777,7 +5229,7 @@
 </p:sld>
 </file>
 
-<file path=ppt/slides/slide3.xml><?xml version="1.0" encoding="utf-8"?>
+<file path=ppt/slides/slide2.xml><?xml version="1.0" encoding="utf-8"?>
 <p:sld xmlns:a="http://schemas.openxmlformats.org/drawingml/2006/main" xmlns:r="http://schemas.openxmlformats.org/officeDocument/2006/relationships" xmlns:p="http://schemas.openxmlformats.org/presentationml/2006/main">
   <p:cSld>
     <p:spTree>
@@ -5833,9 +5285,7 @@
           <p:nvPr/>
         </p:nvPicPr>
         <p:blipFill>
-          <a:blip r:embed="rId2">
-            <a:extLst/>
-          </a:blip>
+          <a:blip r:embed="rId2"/>
           <a:stretch>
             <a:fillRect/>
           </a:stretch>
@@ -6596,6 +6046,369 @@
                 <a:cs typeface="Calibri"/>
               </a:rPr>
               <a:t> Consultants, Inc. </a:t>
+            </a:r>
+          </a:p>
+        </p:txBody>
+      </p:sp>
+    </p:spTree>
+  </p:cSld>
+  <p:clrMapOvr>
+    <a:masterClrMapping/>
+  </p:clrMapOvr>
+  <p:transition spd="med"/>
+</p:sld>
+</file>
+
+<file path=ppt/slides/slide3.xml><?xml version="1.0" encoding="utf-8"?>
+<p:sld xmlns:a="http://schemas.openxmlformats.org/drawingml/2006/main" xmlns:r="http://schemas.openxmlformats.org/officeDocument/2006/relationships" xmlns:p="http://schemas.openxmlformats.org/presentationml/2006/main">
+  <p:cSld>
+    <p:spTree>
+      <p:nvGrpSpPr>
+        <p:cNvPr id="1" name=""/>
+        <p:cNvGrpSpPr/>
+        <p:nvPr/>
+      </p:nvGrpSpPr>
+      <p:grpSpPr>
+        <a:xfrm>
+          <a:off x="0" y="0"/>
+          <a:ext cx="0" cy="0"/>
+          <a:chOff x="0" y="0"/>
+          <a:chExt cx="0" cy="0"/>
+        </a:xfrm>
+      </p:grpSpPr>
+      <p:sp>
+        <p:nvSpPr>
+          <p:cNvPr id="190" name="Text"/>
+          <p:cNvSpPr txBox="1">
+            <a:spLocks noGrp="1"/>
+          </p:cNvSpPr>
+          <p:nvPr>
+            <p:ph type="body" idx="13"/>
+          </p:nvPr>
+        </p:nvSpPr>
+        <p:spPr>
+          <a:xfrm>
+            <a:off x="406400" y="508968"/>
+            <a:ext cx="11176000" cy="405432"/>
+          </a:xfrm>
+          <a:prstGeom prst="rect">
+            <a:avLst/>
+          </a:prstGeom>
+        </p:spPr>
+        <p:txBody>
+          <a:bodyPr/>
+          <a:lstStyle/>
+          <a:p>
+            <a:r>
+              <a:rPr lang="en-US" dirty="0"/>
+              <a:t>IC Candidates</a:t>
+            </a:r>
+          </a:p>
+        </p:txBody>
+      </p:sp>
+      <p:pic>
+        <p:nvPicPr>
+          <p:cNvPr id="191" name="Picture 5" descr="Picture 5"/>
+          <p:cNvPicPr>
+            <a:picLocks noChangeAspect="1"/>
+          </p:cNvPicPr>
+          <p:nvPr/>
+        </p:nvPicPr>
+        <p:blipFill>
+          <a:blip r:embed="rId2"/>
+          <a:stretch>
+            <a:fillRect/>
+          </a:stretch>
+        </p:blipFill>
+        <p:spPr>
+          <a:xfrm>
+            <a:off x="406400" y="2153357"/>
+            <a:ext cx="3057263" cy="3346898"/>
+          </a:xfrm>
+          <a:prstGeom prst="rect">
+            <a:avLst/>
+          </a:prstGeom>
+          <a:ln w="12700">
+            <a:miter lim="400000"/>
+          </a:ln>
+        </p:spPr>
+      </p:pic>
+      <p:sp>
+        <p:nvSpPr>
+          <p:cNvPr id="192" name="Title 1"/>
+          <p:cNvSpPr txBox="1">
+            <a:spLocks noGrp="1"/>
+          </p:cNvSpPr>
+          <p:nvPr>
+            <p:ph type="title"/>
+          </p:nvPr>
+        </p:nvSpPr>
+        <p:spPr>
+          <a:xfrm>
+            <a:off x="406400" y="1129592"/>
+            <a:ext cx="12192000" cy="723901"/>
+          </a:xfrm>
+          <a:prstGeom prst="rect">
+            <a:avLst/>
+          </a:prstGeom>
+        </p:spPr>
+        <p:txBody>
+          <a:bodyPr/>
+          <a:lstStyle>
+            <a:lvl1pPr defTabSz="467359">
+              <a:spcBef>
+                <a:spcPts val="2200"/>
+              </a:spcBef>
+              <a:buClr>
+                <a:schemeClr val="accent1"/>
+              </a:buClr>
+              <a:buFont typeface="Avenir Next"/>
+              <a:defRPr sz="4800"/>
+            </a:lvl1pPr>
+          </a:lstStyle>
+          <a:p>
+            <a:r>
+              <a:rPr dirty="0"/>
+              <a:t>Mr. </a:t>
+            </a:r>
+            <a:r>
+              <a:rPr dirty="0" err="1"/>
+              <a:t>Vipoota</a:t>
+            </a:r>
+            <a:r>
+              <a:rPr dirty="0"/>
+              <a:t> </a:t>
+            </a:r>
+            <a:r>
+              <a:rPr dirty="0" err="1"/>
+              <a:t>Trakulhoon</a:t>
+            </a:r>
+            <a:endParaRPr dirty="0"/>
+          </a:p>
+        </p:txBody>
+      </p:sp>
+      <p:sp>
+        <p:nvSpPr>
+          <p:cNvPr id="193" name="Content Placeholder 2"/>
+          <p:cNvSpPr txBox="1">
+            <a:spLocks noGrp="1"/>
+          </p:cNvSpPr>
+          <p:nvPr>
+            <p:ph type="body" sz="half" idx="1"/>
+          </p:nvPr>
+        </p:nvSpPr>
+        <p:spPr>
+          <a:xfrm>
+            <a:off x="3891711" y="2153357"/>
+            <a:ext cx="8000108" cy="6108700"/>
+          </a:xfrm>
+          <a:prstGeom prst="rect">
+            <a:avLst/>
+          </a:prstGeom>
+        </p:spPr>
+        <p:txBody>
+          <a:bodyPr>
+            <a:normAutofit/>
+          </a:bodyPr>
+          <a:lstStyle/>
+          <a:p>
+            <a:pPr marL="0" indent="0" defTabSz="420624" rtl="0">
+              <a:lnSpc>
+                <a:spcPct val="81000"/>
+              </a:lnSpc>
+              <a:spcBef>
+                <a:spcPts val="2000"/>
+              </a:spcBef>
+              <a:buSzTx/>
+              <a:buNone/>
+              <a:defRPr sz="1728">
+                <a:solidFill>
+                  <a:srgbClr val="000000"/>
+                </a:solidFill>
+              </a:defRPr>
+            </a:pPr>
+            <a:r>
+              <a:rPr sz="2000" b="1" u="sng" dirty="0">
+                <a:solidFill>
+                  <a:srgbClr val="000000"/>
+                </a:solidFill>
+                <a:latin typeface="+mn-lt"/>
+              </a:rPr>
+              <a:t>Education</a:t>
+            </a:r>
+          </a:p>
+          <a:p>
+            <a:pPr marL="0" indent="0" defTabSz="420624" rtl="0">
+              <a:lnSpc>
+                <a:spcPct val="81000"/>
+              </a:lnSpc>
+              <a:spcBef>
+                <a:spcPts val="2000"/>
+              </a:spcBef>
+              <a:buSzTx/>
+              <a:buNone/>
+              <a:defRPr sz="1728">
+                <a:solidFill>
+                  <a:srgbClr val="000000"/>
+                </a:solidFill>
+              </a:defRPr>
+            </a:pPr>
+            <a:r>
+              <a:rPr sz="2000" dirty="0">
+                <a:solidFill>
+                  <a:srgbClr val="000000"/>
+                </a:solidFill>
+                <a:latin typeface="+mn-lt"/>
+              </a:rPr>
+              <a:t>• Master of Business Administration Degree, Sasin Graduate Institute of  Business Administration, Chulalongkorn University </a:t>
+            </a:r>
+          </a:p>
+          <a:p>
+            <a:pPr marL="0" indent="0" defTabSz="420624" rtl="0">
+              <a:lnSpc>
+                <a:spcPct val="81000"/>
+              </a:lnSpc>
+              <a:spcBef>
+                <a:spcPts val="2000"/>
+              </a:spcBef>
+              <a:buSzTx/>
+              <a:buNone/>
+              <a:defRPr sz="1728">
+                <a:solidFill>
+                  <a:srgbClr val="000000"/>
+                </a:solidFill>
+              </a:defRPr>
+            </a:pPr>
+            <a:r>
+              <a:rPr sz="2000" dirty="0">
+                <a:solidFill>
+                  <a:srgbClr val="000000"/>
+                </a:solidFill>
+                <a:latin typeface="+mn-lt"/>
+              </a:rPr>
+              <a:t>• Bachelor of Business Administration degree, Chulalongkorn University</a:t>
+            </a:r>
+          </a:p>
+          <a:p>
+            <a:pPr marL="0" indent="0" defTabSz="420624" rtl="0">
+              <a:lnSpc>
+                <a:spcPct val="81000"/>
+              </a:lnSpc>
+              <a:spcBef>
+                <a:spcPts val="2000"/>
+              </a:spcBef>
+              <a:buSzTx/>
+              <a:buNone/>
+              <a:defRPr sz="1728">
+                <a:solidFill>
+                  <a:srgbClr val="000000"/>
+                </a:solidFill>
+              </a:defRPr>
+            </a:pPr>
+            <a:r>
+              <a:rPr sz="2000" b="1" u="sng" dirty="0">
+                <a:solidFill>
+                  <a:srgbClr val="000000"/>
+                </a:solidFill>
+                <a:latin typeface="+mn-lt"/>
+              </a:rPr>
+              <a:t>Working Experiences</a:t>
+            </a:r>
+          </a:p>
+          <a:p>
+            <a:pPr marL="0" indent="0" defTabSz="420624" rtl="0">
+              <a:lnSpc>
+                <a:spcPct val="81000"/>
+              </a:lnSpc>
+              <a:spcBef>
+                <a:spcPts val="2000"/>
+              </a:spcBef>
+              <a:buSzTx/>
+              <a:buNone/>
+              <a:defRPr sz="1728">
+                <a:solidFill>
+                  <a:srgbClr val="000000"/>
+                </a:solidFill>
+              </a:defRPr>
+            </a:pPr>
+            <a:r>
+              <a:rPr sz="2000" dirty="0">
+                <a:solidFill>
+                  <a:srgbClr val="000000"/>
+                </a:solidFill>
+                <a:latin typeface="+mn-lt"/>
+              </a:rPr>
+              <a:t>• 2014: Director of </a:t>
+            </a:r>
+            <a:r>
+              <a:rPr sz="2000" dirty="0" err="1">
+                <a:solidFill>
+                  <a:srgbClr val="000000"/>
+                </a:solidFill>
+                <a:latin typeface="+mn-lt"/>
+              </a:rPr>
+              <a:t>Millcon</a:t>
+            </a:r>
+            <a:r>
+              <a:rPr sz="2000" dirty="0">
+                <a:solidFill>
+                  <a:srgbClr val="000000"/>
+                </a:solidFill>
+                <a:latin typeface="+mn-lt"/>
+              </a:rPr>
+              <a:t> Steel Plc. </a:t>
+            </a:r>
+          </a:p>
+          <a:p>
+            <a:pPr marL="0" indent="0" defTabSz="420624" rtl="0">
+              <a:lnSpc>
+                <a:spcPct val="81000"/>
+              </a:lnSpc>
+              <a:spcBef>
+                <a:spcPts val="2000"/>
+              </a:spcBef>
+              <a:buSzTx/>
+              <a:buNone/>
+              <a:defRPr sz="1728">
+                <a:solidFill>
+                  <a:srgbClr val="000000"/>
+                </a:solidFill>
+              </a:defRPr>
+            </a:pPr>
+            <a:r>
+              <a:rPr sz="2000" dirty="0">
+                <a:solidFill>
+                  <a:srgbClr val="000000"/>
+                </a:solidFill>
+                <a:latin typeface="+mn-lt"/>
+              </a:rPr>
+              <a:t>• 2013: Chairman of the Board of Directors of KTB Leasing Co., Ltd. </a:t>
+            </a:r>
+          </a:p>
+          <a:p>
+            <a:pPr marL="0" indent="0" defTabSz="420624" rtl="0">
+              <a:lnSpc>
+                <a:spcPct val="81000"/>
+              </a:lnSpc>
+              <a:spcBef>
+                <a:spcPts val="2000"/>
+              </a:spcBef>
+              <a:buSzTx/>
+              <a:buNone/>
+              <a:defRPr sz="1728">
+                <a:solidFill>
+                  <a:srgbClr val="000000"/>
+                </a:solidFill>
+              </a:defRPr>
+            </a:pPr>
+            <a:r>
+              <a:rPr sz="2000" dirty="0">
+                <a:solidFill>
+                  <a:srgbClr val="000000"/>
+                </a:solidFill>
+                <a:latin typeface="+mn-lt"/>
+              </a:rPr>
+              <a:t>• 2011: Senior Executive Vice President, Managing Director Corporate Banking Group of Krung Thai Bank Public Co., Ltd.</a:t>
             </a:r>
           </a:p>
         </p:txBody>
@@ -6656,371 +6469,6 @@
           </a:p>
         </p:txBody>
       </p:sp>
-      <p:pic>
-        <p:nvPicPr>
-          <p:cNvPr id="191" name="Picture 5" descr="Picture 5"/>
-          <p:cNvPicPr>
-            <a:picLocks noChangeAspect="1"/>
-          </p:cNvPicPr>
-          <p:nvPr/>
-        </p:nvPicPr>
-        <p:blipFill>
-          <a:blip r:embed="rId2">
-            <a:extLst/>
-          </a:blip>
-          <a:stretch>
-            <a:fillRect/>
-          </a:stretch>
-        </p:blipFill>
-        <p:spPr>
-          <a:xfrm>
-            <a:off x="406400" y="2153357"/>
-            <a:ext cx="3057263" cy="3346898"/>
-          </a:xfrm>
-          <a:prstGeom prst="rect">
-            <a:avLst/>
-          </a:prstGeom>
-          <a:ln w="12700">
-            <a:miter lim="400000"/>
-          </a:ln>
-        </p:spPr>
-      </p:pic>
-      <p:sp>
-        <p:nvSpPr>
-          <p:cNvPr id="192" name="Title 1"/>
-          <p:cNvSpPr txBox="1">
-            <a:spLocks noGrp="1"/>
-          </p:cNvSpPr>
-          <p:nvPr>
-            <p:ph type="title"/>
-          </p:nvPr>
-        </p:nvSpPr>
-        <p:spPr>
-          <a:xfrm>
-            <a:off x="406400" y="1129592"/>
-            <a:ext cx="12192000" cy="723901"/>
-          </a:xfrm>
-          <a:prstGeom prst="rect">
-            <a:avLst/>
-          </a:prstGeom>
-        </p:spPr>
-        <p:txBody>
-          <a:bodyPr/>
-          <a:lstStyle>
-            <a:lvl1pPr defTabSz="467359">
-              <a:spcBef>
-                <a:spcPts val="2200"/>
-              </a:spcBef>
-              <a:buClr>
-                <a:schemeClr val="accent1"/>
-              </a:buClr>
-              <a:buFont typeface="Avenir Next"/>
-              <a:defRPr sz="4800"/>
-            </a:lvl1pPr>
-          </a:lstStyle>
-          <a:p>
-            <a:r>
-              <a:rPr dirty="0"/>
-              <a:t>Mr. </a:t>
-            </a:r>
-            <a:r>
-              <a:rPr dirty="0" err="1"/>
-              <a:t>Vipoota</a:t>
-            </a:r>
-            <a:r>
-              <a:rPr dirty="0"/>
-              <a:t> </a:t>
-            </a:r>
-            <a:r>
-              <a:rPr dirty="0" err="1"/>
-              <a:t>Trakulhoon</a:t>
-            </a:r>
-            <a:endParaRPr dirty="0"/>
-          </a:p>
-        </p:txBody>
-      </p:sp>
-      <p:sp>
-        <p:nvSpPr>
-          <p:cNvPr id="193" name="Content Placeholder 2"/>
-          <p:cNvSpPr txBox="1">
-            <a:spLocks noGrp="1"/>
-          </p:cNvSpPr>
-          <p:nvPr>
-            <p:ph type="body" sz="half" idx="1"/>
-          </p:nvPr>
-        </p:nvSpPr>
-        <p:spPr>
-          <a:xfrm>
-            <a:off x="3891711" y="2153357"/>
-            <a:ext cx="8000108" cy="6108700"/>
-          </a:xfrm>
-          <a:prstGeom prst="rect">
-            <a:avLst/>
-          </a:prstGeom>
-        </p:spPr>
-        <p:txBody>
-          <a:bodyPr>
-            <a:normAutofit/>
-          </a:bodyPr>
-          <a:lstStyle/>
-          <a:p>
-            <a:pPr marL="0" indent="0" defTabSz="420624" rtl="0">
-              <a:lnSpc>
-                <a:spcPct val="81000"/>
-              </a:lnSpc>
-              <a:spcBef>
-                <a:spcPts val="2000"/>
-              </a:spcBef>
-              <a:buSzTx/>
-              <a:buNone/>
-              <a:defRPr sz="1728">
-                <a:solidFill>
-                  <a:srgbClr val="000000"/>
-                </a:solidFill>
-              </a:defRPr>
-            </a:pPr>
-            <a:r>
-              <a:rPr sz="2000" b="1" u="sng" dirty="0">
-                <a:solidFill>
-                  <a:srgbClr val="000000"/>
-                </a:solidFill>
-                <a:latin typeface="+mn-lt"/>
-              </a:rPr>
-              <a:t>Education</a:t>
-            </a:r>
-          </a:p>
-          <a:p>
-            <a:pPr marL="0" indent="0" defTabSz="420624" rtl="0">
-              <a:lnSpc>
-                <a:spcPct val="81000"/>
-              </a:lnSpc>
-              <a:spcBef>
-                <a:spcPts val="2000"/>
-              </a:spcBef>
-              <a:buSzTx/>
-              <a:buNone/>
-              <a:defRPr sz="1728">
-                <a:solidFill>
-                  <a:srgbClr val="000000"/>
-                </a:solidFill>
-              </a:defRPr>
-            </a:pPr>
-            <a:r>
-              <a:rPr sz="2000" dirty="0">
-                <a:solidFill>
-                  <a:srgbClr val="000000"/>
-                </a:solidFill>
-                <a:latin typeface="+mn-lt"/>
-              </a:rPr>
-              <a:t>• Master of Business Administration Degree, Sasin Graduate Institute of  Business Administration, Chulalongkorn University </a:t>
-            </a:r>
-          </a:p>
-          <a:p>
-            <a:pPr marL="0" indent="0" defTabSz="420624" rtl="0">
-              <a:lnSpc>
-                <a:spcPct val="81000"/>
-              </a:lnSpc>
-              <a:spcBef>
-                <a:spcPts val="2000"/>
-              </a:spcBef>
-              <a:buSzTx/>
-              <a:buNone/>
-              <a:defRPr sz="1728">
-                <a:solidFill>
-                  <a:srgbClr val="000000"/>
-                </a:solidFill>
-              </a:defRPr>
-            </a:pPr>
-            <a:r>
-              <a:rPr sz="2000" dirty="0">
-                <a:solidFill>
-                  <a:srgbClr val="000000"/>
-                </a:solidFill>
-                <a:latin typeface="+mn-lt"/>
-              </a:rPr>
-              <a:t>• Bachelor of Business Administration degree, Chulalongkorn University</a:t>
-            </a:r>
-          </a:p>
-          <a:p>
-            <a:pPr marL="0" indent="0" defTabSz="420624" rtl="0">
-              <a:lnSpc>
-                <a:spcPct val="81000"/>
-              </a:lnSpc>
-              <a:spcBef>
-                <a:spcPts val="2000"/>
-              </a:spcBef>
-              <a:buSzTx/>
-              <a:buNone/>
-              <a:defRPr sz="1728">
-                <a:solidFill>
-                  <a:srgbClr val="000000"/>
-                </a:solidFill>
-              </a:defRPr>
-            </a:pPr>
-            <a:r>
-              <a:rPr sz="2000" b="1" u="sng" dirty="0">
-                <a:solidFill>
-                  <a:srgbClr val="000000"/>
-                </a:solidFill>
-                <a:latin typeface="+mn-lt"/>
-              </a:rPr>
-              <a:t>Working Experiences</a:t>
-            </a:r>
-          </a:p>
-          <a:p>
-            <a:pPr marL="0" indent="0" defTabSz="420624" rtl="0">
-              <a:lnSpc>
-                <a:spcPct val="81000"/>
-              </a:lnSpc>
-              <a:spcBef>
-                <a:spcPts val="2000"/>
-              </a:spcBef>
-              <a:buSzTx/>
-              <a:buNone/>
-              <a:defRPr sz="1728">
-                <a:solidFill>
-                  <a:srgbClr val="000000"/>
-                </a:solidFill>
-              </a:defRPr>
-            </a:pPr>
-            <a:r>
-              <a:rPr sz="2000" dirty="0">
-                <a:solidFill>
-                  <a:srgbClr val="000000"/>
-                </a:solidFill>
-                <a:latin typeface="+mn-lt"/>
-              </a:rPr>
-              <a:t>• 2014: Director of </a:t>
-            </a:r>
-            <a:r>
-              <a:rPr sz="2000" dirty="0" err="1">
-                <a:solidFill>
-                  <a:srgbClr val="000000"/>
-                </a:solidFill>
-                <a:latin typeface="+mn-lt"/>
-              </a:rPr>
-              <a:t>Millcon</a:t>
-            </a:r>
-            <a:r>
-              <a:rPr sz="2000" dirty="0">
-                <a:solidFill>
-                  <a:srgbClr val="000000"/>
-                </a:solidFill>
-                <a:latin typeface="+mn-lt"/>
-              </a:rPr>
-              <a:t> Steel Plc. </a:t>
-            </a:r>
-          </a:p>
-          <a:p>
-            <a:pPr marL="0" indent="0" defTabSz="420624" rtl="0">
-              <a:lnSpc>
-                <a:spcPct val="81000"/>
-              </a:lnSpc>
-              <a:spcBef>
-                <a:spcPts val="2000"/>
-              </a:spcBef>
-              <a:buSzTx/>
-              <a:buNone/>
-              <a:defRPr sz="1728">
-                <a:solidFill>
-                  <a:srgbClr val="000000"/>
-                </a:solidFill>
-              </a:defRPr>
-            </a:pPr>
-            <a:r>
-              <a:rPr sz="2000" dirty="0">
-                <a:solidFill>
-                  <a:srgbClr val="000000"/>
-                </a:solidFill>
-                <a:latin typeface="+mn-lt"/>
-              </a:rPr>
-              <a:t>• 2013: Chairman of the Board of Directors of KTB Leasing Co., Ltd. </a:t>
-            </a:r>
-          </a:p>
-          <a:p>
-            <a:pPr marL="0" indent="0" defTabSz="420624" rtl="0">
-              <a:lnSpc>
-                <a:spcPct val="81000"/>
-              </a:lnSpc>
-              <a:spcBef>
-                <a:spcPts val="2000"/>
-              </a:spcBef>
-              <a:buSzTx/>
-              <a:buNone/>
-              <a:defRPr sz="1728">
-                <a:solidFill>
-                  <a:srgbClr val="000000"/>
-                </a:solidFill>
-              </a:defRPr>
-            </a:pPr>
-            <a:r>
-              <a:rPr sz="2000" dirty="0">
-                <a:solidFill>
-                  <a:srgbClr val="000000"/>
-                </a:solidFill>
-                <a:latin typeface="+mn-lt"/>
-              </a:rPr>
-              <a:t>• 2011: Senior Executive Vice President, Managing Director Corporate Banking Group of Krung Thai Bank Public Co., Ltd.</a:t>
-            </a:r>
-          </a:p>
-        </p:txBody>
-      </p:sp>
-    </p:spTree>
-  </p:cSld>
-  <p:clrMapOvr>
-    <a:masterClrMapping/>
-  </p:clrMapOvr>
-  <p:transition spd="med"/>
-</p:sld>
-</file>
-
-<file path=ppt/slides/slide5.xml><?xml version="1.0" encoding="utf-8"?>
-<p:sld xmlns:a="http://schemas.openxmlformats.org/drawingml/2006/main" xmlns:r="http://schemas.openxmlformats.org/officeDocument/2006/relationships" xmlns:p="http://schemas.openxmlformats.org/presentationml/2006/main">
-  <p:cSld>
-    <p:spTree>
-      <p:nvGrpSpPr>
-        <p:cNvPr id="1" name=""/>
-        <p:cNvGrpSpPr/>
-        <p:nvPr/>
-      </p:nvGrpSpPr>
-      <p:grpSpPr>
-        <a:xfrm>
-          <a:off x="0" y="0"/>
-          <a:ext cx="0" cy="0"/>
-          <a:chOff x="0" y="0"/>
-          <a:chExt cx="0" cy="0"/>
-        </a:xfrm>
-      </p:grpSpPr>
-      <p:sp>
-        <p:nvSpPr>
-          <p:cNvPr id="190" name="Text"/>
-          <p:cNvSpPr txBox="1">
-            <a:spLocks noGrp="1"/>
-          </p:cNvSpPr>
-          <p:nvPr>
-            <p:ph type="body" idx="13"/>
-          </p:nvPr>
-        </p:nvSpPr>
-        <p:spPr>
-          <a:xfrm>
-            <a:off x="406400" y="508968"/>
-            <a:ext cx="11176000" cy="405432"/>
-          </a:xfrm>
-          <a:prstGeom prst="rect">
-            <a:avLst/>
-          </a:prstGeom>
-        </p:spPr>
-        <p:txBody>
-          <a:bodyPr/>
-          <a:lstStyle/>
-          <a:p>
-            <a:r>
-              <a:rPr lang="en-US" dirty="0"/>
-              <a:t>IC Candidates</a:t>
-            </a:r>
-          </a:p>
-        </p:txBody>
-      </p:sp>
       <p:sp>
         <p:nvSpPr>
           <p:cNvPr id="192" name="Title 1"/>
@@ -8066,7 +7514,7 @@
 </p:sld>
 </file>
 
-<file path=ppt/slides/slide6.xml><?xml version="1.0" encoding="utf-8"?>
+<file path=ppt/slides/slide5.xml><?xml version="1.0" encoding="utf-8"?>
 <p:sld xmlns:a="http://schemas.openxmlformats.org/drawingml/2006/main" xmlns:r="http://schemas.openxmlformats.org/officeDocument/2006/relationships" xmlns:p="http://schemas.openxmlformats.org/presentationml/2006/main">
   <p:cSld>
     <p:spTree>
@@ -8619,9 +8067,7 @@
           <p:nvPr/>
         </p:nvPicPr>
         <p:blipFill>
-          <a:blip r:embed="rId2">
-            <a:extLst/>
-          </a:blip>
+          <a:blip r:embed="rId2"/>
           <a:stretch>
             <a:fillRect/>
           </a:stretch>
@@ -8648,7 +8094,7 @@
 </p:sld>
 </file>
 
-<file path=ppt/slides/slide7.xml><?xml version="1.0" encoding="utf-8"?>
+<file path=ppt/slides/slide6.xml><?xml version="1.0" encoding="utf-8"?>
 <p:sld xmlns:a="http://schemas.openxmlformats.org/drawingml/2006/main" xmlns:r="http://schemas.openxmlformats.org/officeDocument/2006/relationships" xmlns:p="http://schemas.openxmlformats.org/presentationml/2006/main">
   <p:cSld>
     <p:spTree>
@@ -9070,9 +8516,7 @@
           <p:nvPr/>
         </p:nvPicPr>
         <p:blipFill>
-          <a:blip r:embed="rId2">
-            <a:extLst/>
-          </a:blip>
+          <a:blip r:embed="rId2"/>
           <a:stretch>
             <a:fillRect/>
           </a:stretch>
@@ -9105,9 +8549,7 @@
           <p:nvPr/>
         </p:nvPicPr>
         <p:blipFill>
-          <a:blip r:embed="rId3">
-            <a:extLst/>
-          </a:blip>
+          <a:blip r:embed="rId3"/>
           <a:stretch>
             <a:fillRect/>
           </a:stretch>
@@ -9194,7 +8636,7 @@
 </p:sld>
 </file>
 
-<file path=ppt/slides/slide8.xml><?xml version="1.0" encoding="utf-8"?>
+<file path=ppt/slides/slide7.xml><?xml version="1.0" encoding="utf-8"?>
 <p:sld xmlns:a="http://schemas.openxmlformats.org/drawingml/2006/main" xmlns:r="http://schemas.openxmlformats.org/officeDocument/2006/relationships" xmlns:p="http://schemas.openxmlformats.org/presentationml/2006/main">
   <p:cSld>
     <p:spTree>
@@ -10104,9 +9546,7 @@
           <p:nvPr/>
         </p:nvPicPr>
         <p:blipFill>
-          <a:blip r:embed="rId2">
-            <a:extLst/>
-          </a:blip>
+          <a:blip r:embed="rId2"/>
           <a:stretch>
             <a:fillRect/>
           </a:stretch>
@@ -10133,7 +9573,7 @@
 </p:sld>
 </file>
 
-<file path=ppt/slides/slide9.xml><?xml version="1.0" encoding="utf-8"?>
+<file path=ppt/slides/slide8.xml><?xml version="1.0" encoding="utf-8"?>
 <p:sld xmlns:a="http://schemas.openxmlformats.org/drawingml/2006/main" xmlns:r="http://schemas.openxmlformats.org/officeDocument/2006/relationships" xmlns:p="http://schemas.openxmlformats.org/presentationml/2006/main">
   <p:cSld>
     <p:spTree>
@@ -11016,9 +10456,7 @@
           <p:nvPr/>
         </p:nvPicPr>
         <p:blipFill>
-          <a:blip r:embed="rId2">
-            <a:extLst/>
-          </a:blip>
+          <a:blip r:embed="rId2"/>
           <a:stretch>
             <a:fillRect/>
           </a:stretch>

</xml_diff>

<commit_message>
Revert "delete power point page 1"
This reverts commit c63022b7f74881cdb5459d80f00dc0ec5cee1c13.
</commit_message>
<xml_diff>
--- a/Powerpoint file.pptx
+++ b/Powerpoint file.pptx
@@ -5,17 +5,18 @@
     <p:sldMasterId id="2147483648" r:id="rId1"/>
   </p:sldMasterIdLst>
   <p:notesMasterIdLst>
-    <p:notesMasterId r:id="rId10"/>
+    <p:notesMasterId r:id="rId11"/>
   </p:notesMasterIdLst>
   <p:sldIdLst>
-    <p:sldId id="257" r:id="rId2"/>
-    <p:sldId id="258" r:id="rId3"/>
-    <p:sldId id="259" r:id="rId4"/>
-    <p:sldId id="307" r:id="rId5"/>
-    <p:sldId id="260" r:id="rId6"/>
-    <p:sldId id="261" r:id="rId7"/>
-    <p:sldId id="262" r:id="rId8"/>
-    <p:sldId id="263" r:id="rId9"/>
+    <p:sldId id="256" r:id="rId2"/>
+    <p:sldId id="257" r:id="rId3"/>
+    <p:sldId id="258" r:id="rId4"/>
+    <p:sldId id="259" r:id="rId5"/>
+    <p:sldId id="307" r:id="rId6"/>
+    <p:sldId id="260" r:id="rId7"/>
+    <p:sldId id="261" r:id="rId8"/>
+    <p:sldId id="262" r:id="rId9"/>
+    <p:sldId id="263" r:id="rId10"/>
   </p:sldIdLst>
   <p:sldSz cx="13004800" cy="9753600"/>
   <p:notesSz cx="6858000" cy="9144000"/>
@@ -3827,7 +3828,7 @@
           </a:ln>
           <a:extLst>
             <a:ext uri="{C572A759-6A51-4108-AA02-DFA0A04FC94B}">
-              <ma14:wrappingTextBoxFlag xmlns:ma14="http://schemas.microsoft.com/office/mac/drawingml/2011/main" xmlns:a14="http://schemas.microsoft.com/office/drawing/2010/main" xmlns:m="http://schemas.openxmlformats.org/officeDocument/2006/math" xmlns="" val="1"/>
+              <ma14:wrappingTextBoxFlag xmlns="" xmlns:m="http://schemas.openxmlformats.org/officeDocument/2006/math" xmlns:a14="http://schemas.microsoft.com/office/drawing/2010/main" xmlns:ma14="http://schemas.microsoft.com/office/mac/drawingml/2011/main" val="1"/>
             </a:ext>
           </a:extLst>
         </p:spPr>
@@ -3866,7 +3867,7 @@
           </a:ln>
           <a:extLst>
             <a:ext uri="{C572A759-6A51-4108-AA02-DFA0A04FC94B}">
-              <ma14:wrappingTextBoxFlag xmlns:ma14="http://schemas.microsoft.com/office/mac/drawingml/2011/main" xmlns:a14="http://schemas.microsoft.com/office/drawing/2010/main" xmlns:m="http://schemas.openxmlformats.org/officeDocument/2006/math" xmlns="" val="1"/>
+              <ma14:wrappingTextBoxFlag xmlns="" xmlns:m="http://schemas.openxmlformats.org/officeDocument/2006/math" xmlns:a14="http://schemas.microsoft.com/office/drawing/2010/main" xmlns:ma14="http://schemas.microsoft.com/office/mac/drawingml/2011/main" val="1"/>
             </a:ext>
           </a:extLst>
         </p:spPr>
@@ -4827,6 +4828,551 @@
       </p:grpSpPr>
       <p:sp>
         <p:nvSpPr>
+          <p:cNvPr id="175" name="IC Candidates"/>
+          <p:cNvSpPr txBox="1">
+            <a:spLocks noGrp="1"/>
+          </p:cNvSpPr>
+          <p:nvPr>
+            <p:ph type="body" idx="13"/>
+          </p:nvPr>
+        </p:nvSpPr>
+        <p:spPr>
+          <a:prstGeom prst="rect">
+            <a:avLst/>
+          </a:prstGeom>
+        </p:spPr>
+        <p:txBody>
+          <a:bodyPr/>
+          <a:lstStyle/>
+          <a:p>
+            <a:r>
+              <a:rPr dirty="0"/>
+              <a:t>IC Candidates</a:t>
+            </a:r>
+          </a:p>
+        </p:txBody>
+      </p:sp>
+      <p:sp>
+        <p:nvSpPr>
+          <p:cNvPr id="176" name="Title 1"/>
+          <p:cNvSpPr txBox="1">
+            <a:spLocks noGrp="1"/>
+          </p:cNvSpPr>
+          <p:nvPr>
+            <p:ph type="title"/>
+          </p:nvPr>
+        </p:nvSpPr>
+        <p:spPr>
+          <a:xfrm>
+            <a:off x="406400" y="1153416"/>
+            <a:ext cx="12192000" cy="723900"/>
+          </a:xfrm>
+          <a:prstGeom prst="rect">
+            <a:avLst/>
+          </a:prstGeom>
+        </p:spPr>
+        <p:txBody>
+          <a:bodyPr/>
+          <a:lstStyle>
+            <a:lvl1pPr defTabSz="467359">
+              <a:spcBef>
+                <a:spcPts val="2200"/>
+              </a:spcBef>
+              <a:defRPr sz="4800"/>
+            </a:lvl1pPr>
+          </a:lstStyle>
+          <a:p>
+            <a:r>
+              <a:rPr dirty="0"/>
+              <a:t>Ms. </a:t>
+            </a:r>
+            <a:r>
+              <a:rPr dirty="0" err="1"/>
+              <a:t>Jureerat</a:t>
+            </a:r>
+            <a:r>
+              <a:rPr dirty="0"/>
+              <a:t>  </a:t>
+            </a:r>
+            <a:r>
+              <a:rPr dirty="0" err="1"/>
+              <a:t>Lapanavanich</a:t>
+            </a:r>
+            <a:endParaRPr dirty="0"/>
+          </a:p>
+        </p:txBody>
+      </p:sp>
+      <p:sp>
+        <p:nvSpPr>
+          <p:cNvPr id="177" name="Content Placeholder 2"/>
+          <p:cNvSpPr txBox="1">
+            <a:spLocks noGrp="1"/>
+          </p:cNvSpPr>
+          <p:nvPr>
+            <p:ph type="body" idx="1"/>
+          </p:nvPr>
+        </p:nvSpPr>
+        <p:spPr>
+          <a:xfrm>
+            <a:off x="3936237" y="2142836"/>
+            <a:ext cx="8662163" cy="6297468"/>
+          </a:xfrm>
+          <a:prstGeom prst="rect">
+            <a:avLst/>
+          </a:prstGeom>
+        </p:spPr>
+        <p:txBody>
+          <a:bodyPr>
+            <a:normAutofit/>
+          </a:bodyPr>
+          <a:lstStyle/>
+          <a:p>
+            <a:pPr marL="0" indent="0" defTabSz="420624">
+              <a:lnSpc>
+                <a:spcPct val="81000"/>
+              </a:lnSpc>
+              <a:spcBef>
+                <a:spcPts val="2000"/>
+              </a:spcBef>
+              <a:buSzTx/>
+              <a:buNone/>
+              <a:defRPr sz="1728" u="sng">
+                <a:solidFill>
+                  <a:srgbClr val="000000"/>
+                </a:solidFill>
+              </a:defRPr>
+            </a:pPr>
+            <a:r>
+              <a:rPr sz="2000" b="1" dirty="0">
+                <a:latin typeface="+mn-lt"/>
+              </a:rPr>
+              <a:t>Education</a:t>
+            </a:r>
+          </a:p>
+          <a:p>
+            <a:pPr marL="0" indent="0" defTabSz="420624">
+              <a:lnSpc>
+                <a:spcPct val="81000"/>
+              </a:lnSpc>
+              <a:spcBef>
+                <a:spcPts val="2000"/>
+              </a:spcBef>
+              <a:buSzTx/>
+              <a:buNone/>
+              <a:defRPr sz="1728">
+                <a:solidFill>
+                  <a:srgbClr val="000000"/>
+                </a:solidFill>
+              </a:defRPr>
+            </a:pPr>
+            <a:r>
+              <a:rPr sz="2000" dirty="0">
+                <a:latin typeface="+mn-lt"/>
+              </a:rPr>
+              <a:t>• Master of General Management, Mahidol University</a:t>
+            </a:r>
+          </a:p>
+          <a:p>
+            <a:pPr marL="0" indent="0" defTabSz="420624">
+              <a:lnSpc>
+                <a:spcPct val="81000"/>
+              </a:lnSpc>
+              <a:spcBef>
+                <a:spcPts val="2000"/>
+              </a:spcBef>
+              <a:buSzTx/>
+              <a:buNone/>
+              <a:defRPr sz="1728">
+                <a:solidFill>
+                  <a:srgbClr val="000000"/>
+                </a:solidFill>
+              </a:defRPr>
+            </a:pPr>
+            <a:r>
+              <a:rPr sz="2000" dirty="0">
+                <a:latin typeface="+mn-lt"/>
+              </a:rPr>
+              <a:t>• Bachelor of </a:t>
+            </a:r>
+            <a:r>
+              <a:rPr sz="2000" dirty="0" err="1">
+                <a:latin typeface="+mn-lt"/>
+              </a:rPr>
+              <a:t>Internation</a:t>
+            </a:r>
+            <a:r>
+              <a:rPr sz="2000" dirty="0">
+                <a:latin typeface="+mn-lt"/>
+              </a:rPr>
+              <a:t> Management, Chulalongkorn University</a:t>
+            </a:r>
+          </a:p>
+          <a:p>
+            <a:pPr marL="0" indent="0" defTabSz="420624">
+              <a:lnSpc>
+                <a:spcPct val="81000"/>
+              </a:lnSpc>
+              <a:spcBef>
+                <a:spcPts val="2000"/>
+              </a:spcBef>
+              <a:buSzTx/>
+              <a:buNone/>
+              <a:defRPr sz="1728" u="sng">
+                <a:solidFill>
+                  <a:srgbClr val="000000"/>
+                </a:solidFill>
+              </a:defRPr>
+            </a:pPr>
+            <a:r>
+              <a:rPr sz="2000" b="1" dirty="0">
+                <a:latin typeface="+mn-lt"/>
+              </a:rPr>
+              <a:t>Working Experiences</a:t>
+            </a:r>
+          </a:p>
+          <a:p>
+            <a:pPr marL="0" indent="0" defTabSz="420624">
+              <a:lnSpc>
+                <a:spcPct val="81000"/>
+              </a:lnSpc>
+              <a:spcBef>
+                <a:spcPts val="2000"/>
+              </a:spcBef>
+              <a:buSzTx/>
+              <a:buNone/>
+              <a:defRPr sz="1728">
+                <a:solidFill>
+                  <a:srgbClr val="000000"/>
+                </a:solidFill>
+              </a:defRPr>
+            </a:pPr>
+            <a:r>
+              <a:rPr sz="2000" dirty="0">
+                <a:latin typeface="+mn-lt"/>
+              </a:rPr>
+              <a:t>• 2015 – Present: Executive Vice President of Accounting and Financial of </a:t>
+            </a:r>
+            <a:r>
+              <a:rPr sz="2000" dirty="0" err="1">
+                <a:latin typeface="+mn-lt"/>
+              </a:rPr>
+              <a:t>Millcon</a:t>
+            </a:r>
+            <a:r>
+              <a:rPr sz="2000" dirty="0">
+                <a:latin typeface="+mn-lt"/>
+              </a:rPr>
+              <a:t> Steel Plc. </a:t>
+            </a:r>
+          </a:p>
+          <a:p>
+            <a:pPr marL="0" indent="0" defTabSz="420624">
+              <a:lnSpc>
+                <a:spcPct val="81000"/>
+              </a:lnSpc>
+              <a:spcBef>
+                <a:spcPts val="2000"/>
+              </a:spcBef>
+              <a:buSzTx/>
+              <a:buNone/>
+              <a:defRPr sz="1728">
+                <a:solidFill>
+                  <a:srgbClr val="000000"/>
+                </a:solidFill>
+              </a:defRPr>
+            </a:pPr>
+            <a:r>
+              <a:rPr sz="2000" dirty="0">
+                <a:latin typeface="+mn-lt"/>
+              </a:rPr>
+              <a:t>• 2015 – Present: Investment Committee Member of </a:t>
+            </a:r>
+            <a:r>
+              <a:rPr sz="2000" dirty="0" err="1">
+                <a:latin typeface="+mn-lt"/>
+              </a:rPr>
+              <a:t>Millcon</a:t>
+            </a:r>
+            <a:r>
+              <a:rPr sz="2000" dirty="0">
+                <a:latin typeface="+mn-lt"/>
+              </a:rPr>
+              <a:t> Steel </a:t>
+            </a:r>
+          </a:p>
+          <a:p>
+            <a:pPr marL="0" indent="0" defTabSz="420624">
+              <a:lnSpc>
+                <a:spcPct val="81000"/>
+              </a:lnSpc>
+              <a:spcBef>
+                <a:spcPts val="2000"/>
+              </a:spcBef>
+              <a:buSzTx/>
+              <a:buNone/>
+              <a:defRPr sz="1728">
+                <a:solidFill>
+                  <a:srgbClr val="000000"/>
+                </a:solidFill>
+              </a:defRPr>
+            </a:pPr>
+            <a:r>
+              <a:rPr sz="2000" dirty="0">
+                <a:latin typeface="+mn-lt"/>
+              </a:rPr>
+              <a:t>• 2014 – 2015: Director of </a:t>
+            </a:r>
+            <a:r>
+              <a:rPr sz="2000" dirty="0" err="1">
+                <a:latin typeface="+mn-lt"/>
+              </a:rPr>
+              <a:t>Millcon</a:t>
+            </a:r>
+            <a:r>
+              <a:rPr sz="2000" dirty="0">
+                <a:latin typeface="+mn-lt"/>
+              </a:rPr>
+              <a:t> Special Steel </a:t>
+            </a:r>
+            <a:r>
+              <a:rPr sz="2000" dirty="0" err="1">
+                <a:latin typeface="+mn-lt"/>
+              </a:rPr>
+              <a:t>Co.,Ltd</a:t>
+            </a:r>
+            <a:r>
+              <a:rPr sz="2000" dirty="0">
+                <a:latin typeface="+mn-lt"/>
+              </a:rPr>
+              <a:t>. </a:t>
+            </a:r>
+          </a:p>
+          <a:p>
+            <a:pPr marL="0" indent="0" defTabSz="420624">
+              <a:lnSpc>
+                <a:spcPct val="81000"/>
+              </a:lnSpc>
+              <a:spcBef>
+                <a:spcPts val="2000"/>
+              </a:spcBef>
+              <a:buSzTx/>
+              <a:buNone/>
+              <a:defRPr sz="1728">
+                <a:solidFill>
+                  <a:srgbClr val="000000"/>
+                </a:solidFill>
+              </a:defRPr>
+            </a:pPr>
+            <a:r>
+              <a:rPr sz="2000" dirty="0">
+                <a:latin typeface="+mn-lt"/>
+              </a:rPr>
+              <a:t>• 2012 – 2015: Director of </a:t>
+            </a:r>
+            <a:r>
+              <a:rPr sz="2000" dirty="0" err="1">
+                <a:latin typeface="+mn-lt"/>
+              </a:rPr>
+              <a:t>Zentra-wartung</a:t>
+            </a:r>
+            <a:r>
+              <a:rPr sz="2000" dirty="0">
+                <a:latin typeface="+mn-lt"/>
+              </a:rPr>
+              <a:t> Engineering Co., Ltd. </a:t>
+            </a:r>
+          </a:p>
+          <a:p>
+            <a:pPr marL="0" indent="0" defTabSz="420624">
+              <a:lnSpc>
+                <a:spcPct val="81000"/>
+              </a:lnSpc>
+              <a:spcBef>
+                <a:spcPts val="2000"/>
+              </a:spcBef>
+              <a:buSzTx/>
+              <a:buNone/>
+              <a:defRPr sz="1728">
+                <a:solidFill>
+                  <a:srgbClr val="000000"/>
+                </a:solidFill>
+              </a:defRPr>
+            </a:pPr>
+            <a:r>
+              <a:rPr sz="2000" dirty="0">
+                <a:latin typeface="+mn-lt"/>
+              </a:rPr>
+              <a:t>• 2011 – 2014: Head of CEO Office of </a:t>
+            </a:r>
+            <a:r>
+              <a:rPr sz="2000" dirty="0" err="1">
+                <a:latin typeface="+mn-lt"/>
+              </a:rPr>
+              <a:t>Millcon</a:t>
+            </a:r>
+            <a:r>
+              <a:rPr sz="2000" dirty="0">
+                <a:latin typeface="+mn-lt"/>
+              </a:rPr>
+              <a:t> Steel Plc </a:t>
+            </a:r>
+          </a:p>
+          <a:p>
+            <a:pPr marL="0" indent="0" defTabSz="420624">
+              <a:lnSpc>
+                <a:spcPct val="81000"/>
+              </a:lnSpc>
+              <a:spcBef>
+                <a:spcPts val="2000"/>
+              </a:spcBef>
+              <a:buSzTx/>
+              <a:buNone/>
+              <a:defRPr sz="1728">
+                <a:solidFill>
+                  <a:srgbClr val="000000"/>
+                </a:solidFill>
+              </a:defRPr>
+            </a:pPr>
+            <a:r>
+              <a:rPr sz="2000" dirty="0">
+                <a:latin typeface="+mn-lt"/>
+              </a:rPr>
+              <a:t>• 2010 – present: Director of </a:t>
+            </a:r>
+            <a:r>
+              <a:rPr sz="2000" dirty="0" err="1">
+                <a:latin typeface="+mn-lt"/>
+              </a:rPr>
+              <a:t>Millcon</a:t>
+            </a:r>
+            <a:r>
+              <a:rPr sz="2000" dirty="0">
+                <a:latin typeface="+mn-lt"/>
+              </a:rPr>
+              <a:t> </a:t>
+            </a:r>
+            <a:r>
+              <a:rPr sz="2000" dirty="0" err="1">
+                <a:latin typeface="+mn-lt"/>
+              </a:rPr>
+              <a:t>Burapa</a:t>
+            </a:r>
+            <a:r>
+              <a:rPr sz="2000" dirty="0">
+                <a:latin typeface="+mn-lt"/>
+              </a:rPr>
+              <a:t> </a:t>
+            </a:r>
+            <a:r>
+              <a:rPr sz="2000" dirty="0" err="1">
+                <a:latin typeface="+mn-lt"/>
+              </a:rPr>
+              <a:t>Co.,Ltd</a:t>
+            </a:r>
+            <a:r>
+              <a:rPr sz="2000" dirty="0">
+                <a:latin typeface="+mn-lt"/>
+              </a:rPr>
+              <a:t>.</a:t>
+            </a:r>
+          </a:p>
+          <a:p>
+            <a:pPr marL="0" indent="0" defTabSz="420624">
+              <a:lnSpc>
+                <a:spcPct val="81000"/>
+              </a:lnSpc>
+              <a:spcBef>
+                <a:spcPts val="2000"/>
+              </a:spcBef>
+              <a:buSzTx/>
+              <a:buNone/>
+              <a:defRPr sz="1728">
+                <a:solidFill>
+                  <a:srgbClr val="000000"/>
+                </a:solidFill>
+              </a:defRPr>
+            </a:pPr>
+            <a:r>
+              <a:rPr sz="2000" dirty="0">
+                <a:latin typeface="+mn-lt"/>
+              </a:rPr>
+              <a:t>• 2009 – present: Executive Director of </a:t>
+            </a:r>
+            <a:r>
+              <a:rPr sz="2000" dirty="0" err="1">
+                <a:latin typeface="+mn-lt"/>
+              </a:rPr>
+              <a:t>Millcon</a:t>
+            </a:r>
+            <a:r>
+              <a:rPr sz="2000" dirty="0">
+                <a:latin typeface="+mn-lt"/>
+              </a:rPr>
+              <a:t> Steel Plc.</a:t>
+            </a:r>
+            <a:endParaRPr sz="1800" dirty="0">
+              <a:latin typeface="+mn-lt"/>
+            </a:endParaRPr>
+          </a:p>
+        </p:txBody>
+      </p:sp>
+      <p:pic>
+        <p:nvPicPr>
+          <p:cNvPr id="178" name="Picture 3" descr="Picture 3"/>
+          <p:cNvPicPr>
+            <a:picLocks noChangeAspect="1"/>
+          </p:cNvPicPr>
+          <p:nvPr/>
+        </p:nvPicPr>
+        <p:blipFill>
+          <a:blip r:embed="rId2">
+            <a:extLst/>
+          </a:blip>
+          <a:stretch>
+            <a:fillRect/>
+          </a:stretch>
+        </p:blipFill>
+        <p:spPr>
+          <a:xfrm>
+            <a:off x="406400" y="2142836"/>
+            <a:ext cx="3056904" cy="3346504"/>
+          </a:xfrm>
+          <a:prstGeom prst="rect">
+            <a:avLst/>
+          </a:prstGeom>
+          <a:ln w="12700">
+            <a:miter lim="400000"/>
+          </a:ln>
+        </p:spPr>
+      </p:pic>
+    </p:spTree>
+  </p:cSld>
+  <p:clrMapOvr>
+    <a:masterClrMapping/>
+  </p:clrMapOvr>
+  <p:transition spd="med"/>
+</p:sld>
+</file>
+
+<file path=ppt/slides/slide2.xml><?xml version="1.0" encoding="utf-8"?>
+<p:sld xmlns:a="http://schemas.openxmlformats.org/drawingml/2006/main" xmlns:r="http://schemas.openxmlformats.org/officeDocument/2006/relationships" xmlns:p="http://schemas.openxmlformats.org/presentationml/2006/main">
+  <p:cSld>
+    <p:spTree>
+      <p:nvGrpSpPr>
+        <p:cNvPr id="1" name=""/>
+        <p:cNvGrpSpPr/>
+        <p:nvPr/>
+      </p:nvGrpSpPr>
+      <p:grpSpPr>
+        <a:xfrm>
+          <a:off x="0" y="0"/>
+          <a:ext cx="0" cy="0"/>
+          <a:chOff x="0" y="0"/>
+          <a:chExt cx="0" cy="0"/>
+        </a:xfrm>
+      </p:grpSpPr>
+      <p:sp>
+        <p:nvSpPr>
           <p:cNvPr id="180" name="IC candidates"/>
           <p:cNvSpPr txBox="1">
             <a:spLocks noGrp="1"/>
@@ -4859,7 +5405,9 @@
           <p:nvPr/>
         </p:nvPicPr>
         <p:blipFill>
-          <a:blip r:embed="rId2"/>
+          <a:blip r:embed="rId2">
+            <a:extLst/>
+          </a:blip>
           <a:stretch>
             <a:fillRect/>
           </a:stretch>
@@ -5229,7 +5777,7 @@
 </p:sld>
 </file>
 
-<file path=ppt/slides/slide2.xml><?xml version="1.0" encoding="utf-8"?>
+<file path=ppt/slides/slide3.xml><?xml version="1.0" encoding="utf-8"?>
 <p:sld xmlns:a="http://schemas.openxmlformats.org/drawingml/2006/main" xmlns:r="http://schemas.openxmlformats.org/officeDocument/2006/relationships" xmlns:p="http://schemas.openxmlformats.org/presentationml/2006/main">
   <p:cSld>
     <p:spTree>
@@ -5285,7 +5833,9 @@
           <p:nvPr/>
         </p:nvPicPr>
         <p:blipFill>
-          <a:blip r:embed="rId2"/>
+          <a:blip r:embed="rId2">
+            <a:extLst/>
+          </a:blip>
           <a:stretch>
             <a:fillRect/>
           </a:stretch>
@@ -6046,369 +6596,6 @@
                 <a:cs typeface="Calibri"/>
               </a:rPr>
               <a:t> Consultants, Inc. </a:t>
-            </a:r>
-          </a:p>
-        </p:txBody>
-      </p:sp>
-    </p:spTree>
-  </p:cSld>
-  <p:clrMapOvr>
-    <a:masterClrMapping/>
-  </p:clrMapOvr>
-  <p:transition spd="med"/>
-</p:sld>
-</file>
-
-<file path=ppt/slides/slide3.xml><?xml version="1.0" encoding="utf-8"?>
-<p:sld xmlns:a="http://schemas.openxmlformats.org/drawingml/2006/main" xmlns:r="http://schemas.openxmlformats.org/officeDocument/2006/relationships" xmlns:p="http://schemas.openxmlformats.org/presentationml/2006/main">
-  <p:cSld>
-    <p:spTree>
-      <p:nvGrpSpPr>
-        <p:cNvPr id="1" name=""/>
-        <p:cNvGrpSpPr/>
-        <p:nvPr/>
-      </p:nvGrpSpPr>
-      <p:grpSpPr>
-        <a:xfrm>
-          <a:off x="0" y="0"/>
-          <a:ext cx="0" cy="0"/>
-          <a:chOff x="0" y="0"/>
-          <a:chExt cx="0" cy="0"/>
-        </a:xfrm>
-      </p:grpSpPr>
-      <p:sp>
-        <p:nvSpPr>
-          <p:cNvPr id="190" name="Text"/>
-          <p:cNvSpPr txBox="1">
-            <a:spLocks noGrp="1"/>
-          </p:cNvSpPr>
-          <p:nvPr>
-            <p:ph type="body" idx="13"/>
-          </p:nvPr>
-        </p:nvSpPr>
-        <p:spPr>
-          <a:xfrm>
-            <a:off x="406400" y="508968"/>
-            <a:ext cx="11176000" cy="405432"/>
-          </a:xfrm>
-          <a:prstGeom prst="rect">
-            <a:avLst/>
-          </a:prstGeom>
-        </p:spPr>
-        <p:txBody>
-          <a:bodyPr/>
-          <a:lstStyle/>
-          <a:p>
-            <a:r>
-              <a:rPr lang="en-US" dirty="0"/>
-              <a:t>IC Candidates</a:t>
-            </a:r>
-          </a:p>
-        </p:txBody>
-      </p:sp>
-      <p:pic>
-        <p:nvPicPr>
-          <p:cNvPr id="191" name="Picture 5" descr="Picture 5"/>
-          <p:cNvPicPr>
-            <a:picLocks noChangeAspect="1"/>
-          </p:cNvPicPr>
-          <p:nvPr/>
-        </p:nvPicPr>
-        <p:blipFill>
-          <a:blip r:embed="rId2"/>
-          <a:stretch>
-            <a:fillRect/>
-          </a:stretch>
-        </p:blipFill>
-        <p:spPr>
-          <a:xfrm>
-            <a:off x="406400" y="2153357"/>
-            <a:ext cx="3057263" cy="3346898"/>
-          </a:xfrm>
-          <a:prstGeom prst="rect">
-            <a:avLst/>
-          </a:prstGeom>
-          <a:ln w="12700">
-            <a:miter lim="400000"/>
-          </a:ln>
-        </p:spPr>
-      </p:pic>
-      <p:sp>
-        <p:nvSpPr>
-          <p:cNvPr id="192" name="Title 1"/>
-          <p:cNvSpPr txBox="1">
-            <a:spLocks noGrp="1"/>
-          </p:cNvSpPr>
-          <p:nvPr>
-            <p:ph type="title"/>
-          </p:nvPr>
-        </p:nvSpPr>
-        <p:spPr>
-          <a:xfrm>
-            <a:off x="406400" y="1129592"/>
-            <a:ext cx="12192000" cy="723901"/>
-          </a:xfrm>
-          <a:prstGeom prst="rect">
-            <a:avLst/>
-          </a:prstGeom>
-        </p:spPr>
-        <p:txBody>
-          <a:bodyPr/>
-          <a:lstStyle>
-            <a:lvl1pPr defTabSz="467359">
-              <a:spcBef>
-                <a:spcPts val="2200"/>
-              </a:spcBef>
-              <a:buClr>
-                <a:schemeClr val="accent1"/>
-              </a:buClr>
-              <a:buFont typeface="Avenir Next"/>
-              <a:defRPr sz="4800"/>
-            </a:lvl1pPr>
-          </a:lstStyle>
-          <a:p>
-            <a:r>
-              <a:rPr dirty="0"/>
-              <a:t>Mr. </a:t>
-            </a:r>
-            <a:r>
-              <a:rPr dirty="0" err="1"/>
-              <a:t>Vipoota</a:t>
-            </a:r>
-            <a:r>
-              <a:rPr dirty="0"/>
-              <a:t> </a:t>
-            </a:r>
-            <a:r>
-              <a:rPr dirty="0" err="1"/>
-              <a:t>Trakulhoon</a:t>
-            </a:r>
-            <a:endParaRPr dirty="0"/>
-          </a:p>
-        </p:txBody>
-      </p:sp>
-      <p:sp>
-        <p:nvSpPr>
-          <p:cNvPr id="193" name="Content Placeholder 2"/>
-          <p:cNvSpPr txBox="1">
-            <a:spLocks noGrp="1"/>
-          </p:cNvSpPr>
-          <p:nvPr>
-            <p:ph type="body" sz="half" idx="1"/>
-          </p:nvPr>
-        </p:nvSpPr>
-        <p:spPr>
-          <a:xfrm>
-            <a:off x="3891711" y="2153357"/>
-            <a:ext cx="8000108" cy="6108700"/>
-          </a:xfrm>
-          <a:prstGeom prst="rect">
-            <a:avLst/>
-          </a:prstGeom>
-        </p:spPr>
-        <p:txBody>
-          <a:bodyPr>
-            <a:normAutofit/>
-          </a:bodyPr>
-          <a:lstStyle/>
-          <a:p>
-            <a:pPr marL="0" indent="0" defTabSz="420624" rtl="0">
-              <a:lnSpc>
-                <a:spcPct val="81000"/>
-              </a:lnSpc>
-              <a:spcBef>
-                <a:spcPts val="2000"/>
-              </a:spcBef>
-              <a:buSzTx/>
-              <a:buNone/>
-              <a:defRPr sz="1728">
-                <a:solidFill>
-                  <a:srgbClr val="000000"/>
-                </a:solidFill>
-              </a:defRPr>
-            </a:pPr>
-            <a:r>
-              <a:rPr sz="2000" b="1" u="sng" dirty="0">
-                <a:solidFill>
-                  <a:srgbClr val="000000"/>
-                </a:solidFill>
-                <a:latin typeface="+mn-lt"/>
-              </a:rPr>
-              <a:t>Education</a:t>
-            </a:r>
-          </a:p>
-          <a:p>
-            <a:pPr marL="0" indent="0" defTabSz="420624" rtl="0">
-              <a:lnSpc>
-                <a:spcPct val="81000"/>
-              </a:lnSpc>
-              <a:spcBef>
-                <a:spcPts val="2000"/>
-              </a:spcBef>
-              <a:buSzTx/>
-              <a:buNone/>
-              <a:defRPr sz="1728">
-                <a:solidFill>
-                  <a:srgbClr val="000000"/>
-                </a:solidFill>
-              </a:defRPr>
-            </a:pPr>
-            <a:r>
-              <a:rPr sz="2000" dirty="0">
-                <a:solidFill>
-                  <a:srgbClr val="000000"/>
-                </a:solidFill>
-                <a:latin typeface="+mn-lt"/>
-              </a:rPr>
-              <a:t>• Master of Business Administration Degree, Sasin Graduate Institute of  Business Administration, Chulalongkorn University </a:t>
-            </a:r>
-          </a:p>
-          <a:p>
-            <a:pPr marL="0" indent="0" defTabSz="420624" rtl="0">
-              <a:lnSpc>
-                <a:spcPct val="81000"/>
-              </a:lnSpc>
-              <a:spcBef>
-                <a:spcPts val="2000"/>
-              </a:spcBef>
-              <a:buSzTx/>
-              <a:buNone/>
-              <a:defRPr sz="1728">
-                <a:solidFill>
-                  <a:srgbClr val="000000"/>
-                </a:solidFill>
-              </a:defRPr>
-            </a:pPr>
-            <a:r>
-              <a:rPr sz="2000" dirty="0">
-                <a:solidFill>
-                  <a:srgbClr val="000000"/>
-                </a:solidFill>
-                <a:latin typeface="+mn-lt"/>
-              </a:rPr>
-              <a:t>• Bachelor of Business Administration degree, Chulalongkorn University</a:t>
-            </a:r>
-          </a:p>
-          <a:p>
-            <a:pPr marL="0" indent="0" defTabSz="420624" rtl="0">
-              <a:lnSpc>
-                <a:spcPct val="81000"/>
-              </a:lnSpc>
-              <a:spcBef>
-                <a:spcPts val="2000"/>
-              </a:spcBef>
-              <a:buSzTx/>
-              <a:buNone/>
-              <a:defRPr sz="1728">
-                <a:solidFill>
-                  <a:srgbClr val="000000"/>
-                </a:solidFill>
-              </a:defRPr>
-            </a:pPr>
-            <a:r>
-              <a:rPr sz="2000" b="1" u="sng" dirty="0">
-                <a:solidFill>
-                  <a:srgbClr val="000000"/>
-                </a:solidFill>
-                <a:latin typeface="+mn-lt"/>
-              </a:rPr>
-              <a:t>Working Experiences</a:t>
-            </a:r>
-          </a:p>
-          <a:p>
-            <a:pPr marL="0" indent="0" defTabSz="420624" rtl="0">
-              <a:lnSpc>
-                <a:spcPct val="81000"/>
-              </a:lnSpc>
-              <a:spcBef>
-                <a:spcPts val="2000"/>
-              </a:spcBef>
-              <a:buSzTx/>
-              <a:buNone/>
-              <a:defRPr sz="1728">
-                <a:solidFill>
-                  <a:srgbClr val="000000"/>
-                </a:solidFill>
-              </a:defRPr>
-            </a:pPr>
-            <a:r>
-              <a:rPr sz="2000" dirty="0">
-                <a:solidFill>
-                  <a:srgbClr val="000000"/>
-                </a:solidFill>
-                <a:latin typeface="+mn-lt"/>
-              </a:rPr>
-              <a:t>• 2014: Director of </a:t>
-            </a:r>
-            <a:r>
-              <a:rPr sz="2000" dirty="0" err="1">
-                <a:solidFill>
-                  <a:srgbClr val="000000"/>
-                </a:solidFill>
-                <a:latin typeface="+mn-lt"/>
-              </a:rPr>
-              <a:t>Millcon</a:t>
-            </a:r>
-            <a:r>
-              <a:rPr sz="2000" dirty="0">
-                <a:solidFill>
-                  <a:srgbClr val="000000"/>
-                </a:solidFill>
-                <a:latin typeface="+mn-lt"/>
-              </a:rPr>
-              <a:t> Steel Plc. </a:t>
-            </a:r>
-          </a:p>
-          <a:p>
-            <a:pPr marL="0" indent="0" defTabSz="420624" rtl="0">
-              <a:lnSpc>
-                <a:spcPct val="81000"/>
-              </a:lnSpc>
-              <a:spcBef>
-                <a:spcPts val="2000"/>
-              </a:spcBef>
-              <a:buSzTx/>
-              <a:buNone/>
-              <a:defRPr sz="1728">
-                <a:solidFill>
-                  <a:srgbClr val="000000"/>
-                </a:solidFill>
-              </a:defRPr>
-            </a:pPr>
-            <a:r>
-              <a:rPr sz="2000" dirty="0">
-                <a:solidFill>
-                  <a:srgbClr val="000000"/>
-                </a:solidFill>
-                <a:latin typeface="+mn-lt"/>
-              </a:rPr>
-              <a:t>• 2013: Chairman of the Board of Directors of KTB Leasing Co., Ltd. </a:t>
-            </a:r>
-          </a:p>
-          <a:p>
-            <a:pPr marL="0" indent="0" defTabSz="420624" rtl="0">
-              <a:lnSpc>
-                <a:spcPct val="81000"/>
-              </a:lnSpc>
-              <a:spcBef>
-                <a:spcPts val="2000"/>
-              </a:spcBef>
-              <a:buSzTx/>
-              <a:buNone/>
-              <a:defRPr sz="1728">
-                <a:solidFill>
-                  <a:srgbClr val="000000"/>
-                </a:solidFill>
-              </a:defRPr>
-            </a:pPr>
-            <a:r>
-              <a:rPr sz="2000" dirty="0">
-                <a:solidFill>
-                  <a:srgbClr val="000000"/>
-                </a:solidFill>
-                <a:latin typeface="+mn-lt"/>
-              </a:rPr>
-              <a:t>• 2011: Senior Executive Vice President, Managing Director Corporate Banking Group of Krung Thai Bank Public Co., Ltd.</a:t>
             </a:r>
           </a:p>
         </p:txBody>
@@ -6469,6 +6656,371 @@
           </a:p>
         </p:txBody>
       </p:sp>
+      <p:pic>
+        <p:nvPicPr>
+          <p:cNvPr id="191" name="Picture 5" descr="Picture 5"/>
+          <p:cNvPicPr>
+            <a:picLocks noChangeAspect="1"/>
+          </p:cNvPicPr>
+          <p:nvPr/>
+        </p:nvPicPr>
+        <p:blipFill>
+          <a:blip r:embed="rId2">
+            <a:extLst/>
+          </a:blip>
+          <a:stretch>
+            <a:fillRect/>
+          </a:stretch>
+        </p:blipFill>
+        <p:spPr>
+          <a:xfrm>
+            <a:off x="406400" y="2153357"/>
+            <a:ext cx="3057263" cy="3346898"/>
+          </a:xfrm>
+          <a:prstGeom prst="rect">
+            <a:avLst/>
+          </a:prstGeom>
+          <a:ln w="12700">
+            <a:miter lim="400000"/>
+          </a:ln>
+        </p:spPr>
+      </p:pic>
+      <p:sp>
+        <p:nvSpPr>
+          <p:cNvPr id="192" name="Title 1"/>
+          <p:cNvSpPr txBox="1">
+            <a:spLocks noGrp="1"/>
+          </p:cNvSpPr>
+          <p:nvPr>
+            <p:ph type="title"/>
+          </p:nvPr>
+        </p:nvSpPr>
+        <p:spPr>
+          <a:xfrm>
+            <a:off x="406400" y="1129592"/>
+            <a:ext cx="12192000" cy="723901"/>
+          </a:xfrm>
+          <a:prstGeom prst="rect">
+            <a:avLst/>
+          </a:prstGeom>
+        </p:spPr>
+        <p:txBody>
+          <a:bodyPr/>
+          <a:lstStyle>
+            <a:lvl1pPr defTabSz="467359">
+              <a:spcBef>
+                <a:spcPts val="2200"/>
+              </a:spcBef>
+              <a:buClr>
+                <a:schemeClr val="accent1"/>
+              </a:buClr>
+              <a:buFont typeface="Avenir Next"/>
+              <a:defRPr sz="4800"/>
+            </a:lvl1pPr>
+          </a:lstStyle>
+          <a:p>
+            <a:r>
+              <a:rPr dirty="0"/>
+              <a:t>Mr. </a:t>
+            </a:r>
+            <a:r>
+              <a:rPr dirty="0" err="1"/>
+              <a:t>Vipoota</a:t>
+            </a:r>
+            <a:r>
+              <a:rPr dirty="0"/>
+              <a:t> </a:t>
+            </a:r>
+            <a:r>
+              <a:rPr dirty="0" err="1"/>
+              <a:t>Trakulhoon</a:t>
+            </a:r>
+            <a:endParaRPr dirty="0"/>
+          </a:p>
+        </p:txBody>
+      </p:sp>
+      <p:sp>
+        <p:nvSpPr>
+          <p:cNvPr id="193" name="Content Placeholder 2"/>
+          <p:cNvSpPr txBox="1">
+            <a:spLocks noGrp="1"/>
+          </p:cNvSpPr>
+          <p:nvPr>
+            <p:ph type="body" sz="half" idx="1"/>
+          </p:nvPr>
+        </p:nvSpPr>
+        <p:spPr>
+          <a:xfrm>
+            <a:off x="3891711" y="2153357"/>
+            <a:ext cx="8000108" cy="6108700"/>
+          </a:xfrm>
+          <a:prstGeom prst="rect">
+            <a:avLst/>
+          </a:prstGeom>
+        </p:spPr>
+        <p:txBody>
+          <a:bodyPr>
+            <a:normAutofit/>
+          </a:bodyPr>
+          <a:lstStyle/>
+          <a:p>
+            <a:pPr marL="0" indent="0" defTabSz="420624" rtl="0">
+              <a:lnSpc>
+                <a:spcPct val="81000"/>
+              </a:lnSpc>
+              <a:spcBef>
+                <a:spcPts val="2000"/>
+              </a:spcBef>
+              <a:buSzTx/>
+              <a:buNone/>
+              <a:defRPr sz="1728">
+                <a:solidFill>
+                  <a:srgbClr val="000000"/>
+                </a:solidFill>
+              </a:defRPr>
+            </a:pPr>
+            <a:r>
+              <a:rPr sz="2000" b="1" u="sng" dirty="0">
+                <a:solidFill>
+                  <a:srgbClr val="000000"/>
+                </a:solidFill>
+                <a:latin typeface="+mn-lt"/>
+              </a:rPr>
+              <a:t>Education</a:t>
+            </a:r>
+          </a:p>
+          <a:p>
+            <a:pPr marL="0" indent="0" defTabSz="420624" rtl="0">
+              <a:lnSpc>
+                <a:spcPct val="81000"/>
+              </a:lnSpc>
+              <a:spcBef>
+                <a:spcPts val="2000"/>
+              </a:spcBef>
+              <a:buSzTx/>
+              <a:buNone/>
+              <a:defRPr sz="1728">
+                <a:solidFill>
+                  <a:srgbClr val="000000"/>
+                </a:solidFill>
+              </a:defRPr>
+            </a:pPr>
+            <a:r>
+              <a:rPr sz="2000" dirty="0">
+                <a:solidFill>
+                  <a:srgbClr val="000000"/>
+                </a:solidFill>
+                <a:latin typeface="+mn-lt"/>
+              </a:rPr>
+              <a:t>• Master of Business Administration Degree, Sasin Graduate Institute of  Business Administration, Chulalongkorn University </a:t>
+            </a:r>
+          </a:p>
+          <a:p>
+            <a:pPr marL="0" indent="0" defTabSz="420624" rtl="0">
+              <a:lnSpc>
+                <a:spcPct val="81000"/>
+              </a:lnSpc>
+              <a:spcBef>
+                <a:spcPts val="2000"/>
+              </a:spcBef>
+              <a:buSzTx/>
+              <a:buNone/>
+              <a:defRPr sz="1728">
+                <a:solidFill>
+                  <a:srgbClr val="000000"/>
+                </a:solidFill>
+              </a:defRPr>
+            </a:pPr>
+            <a:r>
+              <a:rPr sz="2000" dirty="0">
+                <a:solidFill>
+                  <a:srgbClr val="000000"/>
+                </a:solidFill>
+                <a:latin typeface="+mn-lt"/>
+              </a:rPr>
+              <a:t>• Bachelor of Business Administration degree, Chulalongkorn University</a:t>
+            </a:r>
+          </a:p>
+          <a:p>
+            <a:pPr marL="0" indent="0" defTabSz="420624" rtl="0">
+              <a:lnSpc>
+                <a:spcPct val="81000"/>
+              </a:lnSpc>
+              <a:spcBef>
+                <a:spcPts val="2000"/>
+              </a:spcBef>
+              <a:buSzTx/>
+              <a:buNone/>
+              <a:defRPr sz="1728">
+                <a:solidFill>
+                  <a:srgbClr val="000000"/>
+                </a:solidFill>
+              </a:defRPr>
+            </a:pPr>
+            <a:r>
+              <a:rPr sz="2000" b="1" u="sng" dirty="0">
+                <a:solidFill>
+                  <a:srgbClr val="000000"/>
+                </a:solidFill>
+                <a:latin typeface="+mn-lt"/>
+              </a:rPr>
+              <a:t>Working Experiences</a:t>
+            </a:r>
+          </a:p>
+          <a:p>
+            <a:pPr marL="0" indent="0" defTabSz="420624" rtl="0">
+              <a:lnSpc>
+                <a:spcPct val="81000"/>
+              </a:lnSpc>
+              <a:spcBef>
+                <a:spcPts val="2000"/>
+              </a:spcBef>
+              <a:buSzTx/>
+              <a:buNone/>
+              <a:defRPr sz="1728">
+                <a:solidFill>
+                  <a:srgbClr val="000000"/>
+                </a:solidFill>
+              </a:defRPr>
+            </a:pPr>
+            <a:r>
+              <a:rPr sz="2000" dirty="0">
+                <a:solidFill>
+                  <a:srgbClr val="000000"/>
+                </a:solidFill>
+                <a:latin typeface="+mn-lt"/>
+              </a:rPr>
+              <a:t>• 2014: Director of </a:t>
+            </a:r>
+            <a:r>
+              <a:rPr sz="2000" dirty="0" err="1">
+                <a:solidFill>
+                  <a:srgbClr val="000000"/>
+                </a:solidFill>
+                <a:latin typeface="+mn-lt"/>
+              </a:rPr>
+              <a:t>Millcon</a:t>
+            </a:r>
+            <a:r>
+              <a:rPr sz="2000" dirty="0">
+                <a:solidFill>
+                  <a:srgbClr val="000000"/>
+                </a:solidFill>
+                <a:latin typeface="+mn-lt"/>
+              </a:rPr>
+              <a:t> Steel Plc. </a:t>
+            </a:r>
+          </a:p>
+          <a:p>
+            <a:pPr marL="0" indent="0" defTabSz="420624" rtl="0">
+              <a:lnSpc>
+                <a:spcPct val="81000"/>
+              </a:lnSpc>
+              <a:spcBef>
+                <a:spcPts val="2000"/>
+              </a:spcBef>
+              <a:buSzTx/>
+              <a:buNone/>
+              <a:defRPr sz="1728">
+                <a:solidFill>
+                  <a:srgbClr val="000000"/>
+                </a:solidFill>
+              </a:defRPr>
+            </a:pPr>
+            <a:r>
+              <a:rPr sz="2000" dirty="0">
+                <a:solidFill>
+                  <a:srgbClr val="000000"/>
+                </a:solidFill>
+                <a:latin typeface="+mn-lt"/>
+              </a:rPr>
+              <a:t>• 2013: Chairman of the Board of Directors of KTB Leasing Co., Ltd. </a:t>
+            </a:r>
+          </a:p>
+          <a:p>
+            <a:pPr marL="0" indent="0" defTabSz="420624" rtl="0">
+              <a:lnSpc>
+                <a:spcPct val="81000"/>
+              </a:lnSpc>
+              <a:spcBef>
+                <a:spcPts val="2000"/>
+              </a:spcBef>
+              <a:buSzTx/>
+              <a:buNone/>
+              <a:defRPr sz="1728">
+                <a:solidFill>
+                  <a:srgbClr val="000000"/>
+                </a:solidFill>
+              </a:defRPr>
+            </a:pPr>
+            <a:r>
+              <a:rPr sz="2000" dirty="0">
+                <a:solidFill>
+                  <a:srgbClr val="000000"/>
+                </a:solidFill>
+                <a:latin typeface="+mn-lt"/>
+              </a:rPr>
+              <a:t>• 2011: Senior Executive Vice President, Managing Director Corporate Banking Group of Krung Thai Bank Public Co., Ltd.</a:t>
+            </a:r>
+          </a:p>
+        </p:txBody>
+      </p:sp>
+    </p:spTree>
+  </p:cSld>
+  <p:clrMapOvr>
+    <a:masterClrMapping/>
+  </p:clrMapOvr>
+  <p:transition spd="med"/>
+</p:sld>
+</file>
+
+<file path=ppt/slides/slide5.xml><?xml version="1.0" encoding="utf-8"?>
+<p:sld xmlns:a="http://schemas.openxmlformats.org/drawingml/2006/main" xmlns:r="http://schemas.openxmlformats.org/officeDocument/2006/relationships" xmlns:p="http://schemas.openxmlformats.org/presentationml/2006/main">
+  <p:cSld>
+    <p:spTree>
+      <p:nvGrpSpPr>
+        <p:cNvPr id="1" name=""/>
+        <p:cNvGrpSpPr/>
+        <p:nvPr/>
+      </p:nvGrpSpPr>
+      <p:grpSpPr>
+        <a:xfrm>
+          <a:off x="0" y="0"/>
+          <a:ext cx="0" cy="0"/>
+          <a:chOff x="0" y="0"/>
+          <a:chExt cx="0" cy="0"/>
+        </a:xfrm>
+      </p:grpSpPr>
+      <p:sp>
+        <p:nvSpPr>
+          <p:cNvPr id="190" name="Text"/>
+          <p:cNvSpPr txBox="1">
+            <a:spLocks noGrp="1"/>
+          </p:cNvSpPr>
+          <p:nvPr>
+            <p:ph type="body" idx="13"/>
+          </p:nvPr>
+        </p:nvSpPr>
+        <p:spPr>
+          <a:xfrm>
+            <a:off x="406400" y="508968"/>
+            <a:ext cx="11176000" cy="405432"/>
+          </a:xfrm>
+          <a:prstGeom prst="rect">
+            <a:avLst/>
+          </a:prstGeom>
+        </p:spPr>
+        <p:txBody>
+          <a:bodyPr/>
+          <a:lstStyle/>
+          <a:p>
+            <a:r>
+              <a:rPr lang="en-US" dirty="0"/>
+              <a:t>IC Candidates</a:t>
+            </a:r>
+          </a:p>
+        </p:txBody>
+      </p:sp>
       <p:sp>
         <p:nvSpPr>
           <p:cNvPr id="192" name="Title 1"/>
@@ -7514,7 +8066,7 @@
 </p:sld>
 </file>
 
-<file path=ppt/slides/slide5.xml><?xml version="1.0" encoding="utf-8"?>
+<file path=ppt/slides/slide6.xml><?xml version="1.0" encoding="utf-8"?>
 <p:sld xmlns:a="http://schemas.openxmlformats.org/drawingml/2006/main" xmlns:r="http://schemas.openxmlformats.org/officeDocument/2006/relationships" xmlns:p="http://schemas.openxmlformats.org/presentationml/2006/main">
   <p:cSld>
     <p:spTree>
@@ -8067,7 +8619,9 @@
           <p:nvPr/>
         </p:nvPicPr>
         <p:blipFill>
-          <a:blip r:embed="rId2"/>
+          <a:blip r:embed="rId2">
+            <a:extLst/>
+          </a:blip>
           <a:stretch>
             <a:fillRect/>
           </a:stretch>
@@ -8094,7 +8648,7 @@
 </p:sld>
 </file>
 
-<file path=ppt/slides/slide6.xml><?xml version="1.0" encoding="utf-8"?>
+<file path=ppt/slides/slide7.xml><?xml version="1.0" encoding="utf-8"?>
 <p:sld xmlns:a="http://schemas.openxmlformats.org/drawingml/2006/main" xmlns:r="http://schemas.openxmlformats.org/officeDocument/2006/relationships" xmlns:p="http://schemas.openxmlformats.org/presentationml/2006/main">
   <p:cSld>
     <p:spTree>
@@ -8516,7 +9070,9 @@
           <p:nvPr/>
         </p:nvPicPr>
         <p:blipFill>
-          <a:blip r:embed="rId2"/>
+          <a:blip r:embed="rId2">
+            <a:extLst/>
+          </a:blip>
           <a:stretch>
             <a:fillRect/>
           </a:stretch>
@@ -8549,7 +9105,9 @@
           <p:nvPr/>
         </p:nvPicPr>
         <p:blipFill>
-          <a:blip r:embed="rId3"/>
+          <a:blip r:embed="rId3">
+            <a:extLst/>
+          </a:blip>
           <a:stretch>
             <a:fillRect/>
           </a:stretch>
@@ -8636,7 +9194,7 @@
 </p:sld>
 </file>
 
-<file path=ppt/slides/slide7.xml><?xml version="1.0" encoding="utf-8"?>
+<file path=ppt/slides/slide8.xml><?xml version="1.0" encoding="utf-8"?>
 <p:sld xmlns:a="http://schemas.openxmlformats.org/drawingml/2006/main" xmlns:r="http://schemas.openxmlformats.org/officeDocument/2006/relationships" xmlns:p="http://schemas.openxmlformats.org/presentationml/2006/main">
   <p:cSld>
     <p:spTree>
@@ -9546,7 +10104,9 @@
           <p:nvPr/>
         </p:nvPicPr>
         <p:blipFill>
-          <a:blip r:embed="rId2"/>
+          <a:blip r:embed="rId2">
+            <a:extLst/>
+          </a:blip>
           <a:stretch>
             <a:fillRect/>
           </a:stretch>
@@ -9573,7 +10133,7 @@
 </p:sld>
 </file>
 
-<file path=ppt/slides/slide8.xml><?xml version="1.0" encoding="utf-8"?>
+<file path=ppt/slides/slide9.xml><?xml version="1.0" encoding="utf-8"?>
 <p:sld xmlns:a="http://schemas.openxmlformats.org/drawingml/2006/main" xmlns:r="http://schemas.openxmlformats.org/officeDocument/2006/relationships" xmlns:p="http://schemas.openxmlformats.org/presentationml/2006/main">
   <p:cSld>
     <p:spTree>
@@ -10456,7 +11016,9 @@
           <p:nvPr/>
         </p:nvPicPr>
         <p:blipFill>
-          <a:blip r:embed="rId2"/>
+          <a:blip r:embed="rId2">
+            <a:extLst/>
+          </a:blip>
           <a:stretch>
             <a:fillRect/>
           </a:stretch>

</xml_diff>

<commit_message>
Delete text on slide1
</commit_message>
<xml_diff>
--- a/Powerpoint file.pptx
+++ b/Powerpoint file.pptx
@@ -3828,7 +3828,7 @@
           </a:ln>
           <a:extLst>
             <a:ext uri="{C572A759-6A51-4108-AA02-DFA0A04FC94B}">
-              <ma14:wrappingTextBoxFlag xmlns="" xmlns:m="http://schemas.openxmlformats.org/officeDocument/2006/math" xmlns:a14="http://schemas.microsoft.com/office/drawing/2010/main" xmlns:ma14="http://schemas.microsoft.com/office/mac/drawingml/2011/main" val="1"/>
+              <ma14:wrappingTextBoxFlag xmlns:ma14="http://schemas.microsoft.com/office/mac/drawingml/2011/main" xmlns:a14="http://schemas.microsoft.com/office/drawing/2010/main" xmlns:m="http://schemas.openxmlformats.org/officeDocument/2006/math" xmlns="" val="1"/>
             </a:ext>
           </a:extLst>
         </p:spPr>
@@ -3867,7 +3867,7 @@
           </a:ln>
           <a:extLst>
             <a:ext uri="{C572A759-6A51-4108-AA02-DFA0A04FC94B}">
-              <ma14:wrappingTextBoxFlag xmlns="" xmlns:m="http://schemas.openxmlformats.org/officeDocument/2006/math" xmlns:a14="http://schemas.microsoft.com/office/drawing/2010/main" xmlns:ma14="http://schemas.microsoft.com/office/mac/drawingml/2011/main" val="1"/>
+              <ma14:wrappingTextBoxFlag xmlns:ma14="http://schemas.microsoft.com/office/mac/drawingml/2011/main" xmlns:a14="http://schemas.microsoft.com/office/drawing/2010/main" xmlns:m="http://schemas.openxmlformats.org/officeDocument/2006/math" xmlns="" val="1"/>
             </a:ext>
           </a:extLst>
         </p:spPr>
@@ -4936,180 +4936,6 @@
               </a:spcBef>
               <a:buSzTx/>
               <a:buNone/>
-              <a:defRPr sz="1728" u="sng">
-                <a:solidFill>
-                  <a:srgbClr val="000000"/>
-                </a:solidFill>
-              </a:defRPr>
-            </a:pPr>
-            <a:r>
-              <a:rPr sz="2000" b="1" dirty="0">
-                <a:latin typeface="+mn-lt"/>
-              </a:rPr>
-              <a:t>Education</a:t>
-            </a:r>
-          </a:p>
-          <a:p>
-            <a:pPr marL="0" indent="0" defTabSz="420624">
-              <a:lnSpc>
-                <a:spcPct val="81000"/>
-              </a:lnSpc>
-              <a:spcBef>
-                <a:spcPts val="2000"/>
-              </a:spcBef>
-              <a:buSzTx/>
-              <a:buNone/>
-              <a:defRPr sz="1728">
-                <a:solidFill>
-                  <a:srgbClr val="000000"/>
-                </a:solidFill>
-              </a:defRPr>
-            </a:pPr>
-            <a:r>
-              <a:rPr sz="2000" dirty="0">
-                <a:latin typeface="+mn-lt"/>
-              </a:rPr>
-              <a:t>• Master of General Management, Mahidol University</a:t>
-            </a:r>
-          </a:p>
-          <a:p>
-            <a:pPr marL="0" indent="0" defTabSz="420624">
-              <a:lnSpc>
-                <a:spcPct val="81000"/>
-              </a:lnSpc>
-              <a:spcBef>
-                <a:spcPts val="2000"/>
-              </a:spcBef>
-              <a:buSzTx/>
-              <a:buNone/>
-              <a:defRPr sz="1728">
-                <a:solidFill>
-                  <a:srgbClr val="000000"/>
-                </a:solidFill>
-              </a:defRPr>
-            </a:pPr>
-            <a:r>
-              <a:rPr sz="2000" dirty="0">
-                <a:latin typeface="+mn-lt"/>
-              </a:rPr>
-              <a:t>• Bachelor of </a:t>
-            </a:r>
-            <a:r>
-              <a:rPr sz="2000" dirty="0" err="1">
-                <a:latin typeface="+mn-lt"/>
-              </a:rPr>
-              <a:t>Internation</a:t>
-            </a:r>
-            <a:r>
-              <a:rPr sz="2000" dirty="0">
-                <a:latin typeface="+mn-lt"/>
-              </a:rPr>
-              <a:t> Management, Chulalongkorn University</a:t>
-            </a:r>
-          </a:p>
-          <a:p>
-            <a:pPr marL="0" indent="0" defTabSz="420624">
-              <a:lnSpc>
-                <a:spcPct val="81000"/>
-              </a:lnSpc>
-              <a:spcBef>
-                <a:spcPts val="2000"/>
-              </a:spcBef>
-              <a:buSzTx/>
-              <a:buNone/>
-              <a:defRPr sz="1728" u="sng">
-                <a:solidFill>
-                  <a:srgbClr val="000000"/>
-                </a:solidFill>
-              </a:defRPr>
-            </a:pPr>
-            <a:r>
-              <a:rPr sz="2000" b="1" dirty="0">
-                <a:latin typeface="+mn-lt"/>
-              </a:rPr>
-              <a:t>Working Experiences</a:t>
-            </a:r>
-          </a:p>
-          <a:p>
-            <a:pPr marL="0" indent="0" defTabSz="420624">
-              <a:lnSpc>
-                <a:spcPct val="81000"/>
-              </a:lnSpc>
-              <a:spcBef>
-                <a:spcPts val="2000"/>
-              </a:spcBef>
-              <a:buSzTx/>
-              <a:buNone/>
-              <a:defRPr sz="1728">
-                <a:solidFill>
-                  <a:srgbClr val="000000"/>
-                </a:solidFill>
-              </a:defRPr>
-            </a:pPr>
-            <a:r>
-              <a:rPr sz="2000" dirty="0">
-                <a:latin typeface="+mn-lt"/>
-              </a:rPr>
-              <a:t>• 2015 – Present: Executive Vice President of Accounting and Financial of </a:t>
-            </a:r>
-            <a:r>
-              <a:rPr sz="2000" dirty="0" err="1">
-                <a:latin typeface="+mn-lt"/>
-              </a:rPr>
-              <a:t>Millcon</a:t>
-            </a:r>
-            <a:r>
-              <a:rPr sz="2000" dirty="0">
-                <a:latin typeface="+mn-lt"/>
-              </a:rPr>
-              <a:t> Steel Plc. </a:t>
-            </a:r>
-          </a:p>
-          <a:p>
-            <a:pPr marL="0" indent="0" defTabSz="420624">
-              <a:lnSpc>
-                <a:spcPct val="81000"/>
-              </a:lnSpc>
-              <a:spcBef>
-                <a:spcPts val="2000"/>
-              </a:spcBef>
-              <a:buSzTx/>
-              <a:buNone/>
-              <a:defRPr sz="1728">
-                <a:solidFill>
-                  <a:srgbClr val="000000"/>
-                </a:solidFill>
-              </a:defRPr>
-            </a:pPr>
-            <a:r>
-              <a:rPr sz="2000" dirty="0">
-                <a:latin typeface="+mn-lt"/>
-              </a:rPr>
-              <a:t>• 2015 – Present: Investment Committee Member of </a:t>
-            </a:r>
-            <a:r>
-              <a:rPr sz="2000" dirty="0" err="1">
-                <a:latin typeface="+mn-lt"/>
-              </a:rPr>
-              <a:t>Millcon</a:t>
-            </a:r>
-            <a:r>
-              <a:rPr sz="2000" dirty="0">
-                <a:latin typeface="+mn-lt"/>
-              </a:rPr>
-              <a:t> Steel </a:t>
-            </a:r>
-          </a:p>
-          <a:p>
-            <a:pPr marL="0" indent="0" defTabSz="420624">
-              <a:lnSpc>
-                <a:spcPct val="81000"/>
-              </a:lnSpc>
-              <a:spcBef>
-                <a:spcPts val="2000"/>
-              </a:spcBef>
-              <a:buSzTx/>
-              <a:buNone/>
               <a:defRPr sz="1728">
                 <a:solidFill>
                   <a:srgbClr val="000000"/>
@@ -5325,9 +5151,7 @@
           <p:nvPr/>
         </p:nvPicPr>
         <p:blipFill>
-          <a:blip r:embed="rId2">
-            <a:extLst/>
-          </a:blip>
+          <a:blip r:embed="rId2"/>
           <a:stretch>
             <a:fillRect/>
           </a:stretch>
@@ -5405,9 +5229,7 @@
           <p:nvPr/>
         </p:nvPicPr>
         <p:blipFill>
-          <a:blip r:embed="rId2">
-            <a:extLst/>
-          </a:blip>
+          <a:blip r:embed="rId2"/>
           <a:stretch>
             <a:fillRect/>
           </a:stretch>
@@ -5833,9 +5655,7 @@
           <p:nvPr/>
         </p:nvPicPr>
         <p:blipFill>
-          <a:blip r:embed="rId2">
-            <a:extLst/>
-          </a:blip>
+          <a:blip r:embed="rId2"/>
           <a:stretch>
             <a:fillRect/>
           </a:stretch>
@@ -6665,9 +6485,7 @@
           <p:nvPr/>
         </p:nvPicPr>
         <p:blipFill>
-          <a:blip r:embed="rId2">
-            <a:extLst/>
-          </a:blip>
+          <a:blip r:embed="rId2"/>
           <a:stretch>
             <a:fillRect/>
           </a:stretch>
@@ -8619,9 +8437,7 @@
           <p:nvPr/>
         </p:nvPicPr>
         <p:blipFill>
-          <a:blip r:embed="rId2">
-            <a:extLst/>
-          </a:blip>
+          <a:blip r:embed="rId2"/>
           <a:stretch>
             <a:fillRect/>
           </a:stretch>
@@ -9070,9 +8886,7 @@
           <p:nvPr/>
         </p:nvPicPr>
         <p:blipFill>
-          <a:blip r:embed="rId2">
-            <a:extLst/>
-          </a:blip>
+          <a:blip r:embed="rId2"/>
           <a:stretch>
             <a:fillRect/>
           </a:stretch>
@@ -9105,9 +8919,7 @@
           <p:nvPr/>
         </p:nvPicPr>
         <p:blipFill>
-          <a:blip r:embed="rId3">
-            <a:extLst/>
-          </a:blip>
+          <a:blip r:embed="rId3"/>
           <a:stretch>
             <a:fillRect/>
           </a:stretch>
@@ -10104,9 +9916,7 @@
           <p:nvPr/>
         </p:nvPicPr>
         <p:blipFill>
-          <a:blip r:embed="rId2">
-            <a:extLst/>
-          </a:blip>
+          <a:blip r:embed="rId2"/>
           <a:stretch>
             <a:fillRect/>
           </a:stretch>
@@ -11016,9 +10826,7 @@
           <p:nvPr/>
         </p:nvPicPr>
         <p:blipFill>
-          <a:blip r:embed="rId2">
-            <a:extLst/>
-          </a:blip>
+          <a:blip r:embed="rId2"/>
           <a:stretch>
             <a:fillRect/>
           </a:stretch>

</xml_diff>